<commit_message>
Add texts and boxes to the poster.
</commit_message>
<xml_diff>
--- a/poster_template/d1-ahm-poster-2016.pptx
+++ b/poster_template/d1-ahm-poster-2016.pptx
@@ -832,7 +832,7 @@
                 <a:spcPct val="0"/>
               </a:spcBef>
             </a:pPr>
-            <a:endParaRPr lang="en-US">
+            <a:endParaRPr lang="en-US" dirty="0">
               <a:ea typeface="ＭＳ Ｐゴシック" pitchFamily="-107" charset="-128"/>
               <a:cs typeface="ＭＳ Ｐゴシック" pitchFamily="-107" charset="-128"/>
             </a:endParaRPr>
@@ -4381,7 +4381,7 @@
         </p:nvSpPr>
         <p:spPr bwMode="auto">
           <a:xfrm>
-            <a:off x="271193" y="1925484"/>
+            <a:off x="271193" y="2057600"/>
             <a:ext cx="34714256" cy="1415558"/>
           </a:xfrm>
           <a:prstGeom prst="rect">
@@ -4494,15 +4494,7 @@
             </a:r>
             <a:r>
               <a:rPr lang="en-US" sz="4600" b="1" dirty="0" smtClean="0"/>
-              <a:t>,</a:t>
-            </a:r>
-            <a:r>
-              <a:rPr lang="en-US" sz="4600" b="1" dirty="0" smtClean="0"/>
-              <a:t>Timothy </a:t>
-            </a:r>
-            <a:r>
-              <a:rPr lang="en-US" sz="4600" b="1" dirty="0" smtClean="0"/>
-              <a:t>McPhillips</a:t>
+              <a:t>,Timothy McPhillips</a:t>
             </a:r>
             <a:r>
               <a:rPr lang="en-US" sz="4600" b="1" baseline="30000" dirty="0" smtClean="0"/>
@@ -4510,11 +4502,7 @@
             </a:r>
             <a:r>
               <a:rPr lang="en-US" sz="4600" b="1" dirty="0" smtClean="0"/>
-              <a:t>, </a:t>
-            </a:r>
-            <a:r>
-              <a:rPr lang="en-US" sz="4600" b="1" dirty="0" smtClean="0"/>
-              <a:t>Paolo Missier</a:t>
+              <a:t>, Paolo Missier</a:t>
             </a:r>
             <a:r>
               <a:rPr lang="en-US" sz="4600" b="1" baseline="30000" dirty="0" smtClean="0"/>
@@ -4522,11 +4510,7 @@
             </a:r>
             <a:r>
               <a:rPr lang="en-US" sz="4600" b="1" dirty="0" smtClean="0"/>
-              <a:t>, </a:t>
-            </a:r>
-            <a:r>
-              <a:rPr lang="en-US" sz="4600" b="1" dirty="0" smtClean="0"/>
-              <a:t> </a:t>
+              <a:t>,  </a:t>
             </a:r>
             <a:r>
               <a:rPr lang="en-US" sz="4600" b="1" dirty="0"/>
@@ -4574,11 +4558,7 @@
             </a:r>
             <a:r>
               <a:rPr lang="en-US" sz="2800" dirty="0" smtClean="0"/>
-              <a:t>Department of Electrical and Computer Engineering</a:t>
-            </a:r>
-            <a:r>
-              <a:rPr lang="en-US" sz="2800" dirty="0" smtClean="0"/>
-              <a:t>, </a:t>
+              <a:t>Department of Electrical and Computer Engineering, </a:t>
             </a:r>
             <a:r>
               <a:rPr lang="en-US" sz="2800" dirty="0" err="1" smtClean="0"/>
@@ -4594,19 +4574,11 @@
             </a:r>
             <a:r>
               <a:rPr lang="en-US" sz="2800" dirty="0" smtClean="0"/>
-              <a:t>School </a:t>
-            </a:r>
-            <a:r>
-              <a:rPr lang="en-US" sz="2800" dirty="0" smtClean="0"/>
-              <a:t>of </a:t>
+              <a:t>School of </a:t>
             </a:r>
             <a:r>
               <a:rPr lang="en-US" sz="2800" dirty="0"/>
-              <a:t>Computing Science, </a:t>
-            </a:r>
-            <a:r>
-              <a:rPr lang="en-US" sz="2800" dirty="0"/>
-              <a:t> </a:t>
+              <a:t>Computing Science,  </a:t>
             </a:r>
             <a:r>
               <a:rPr lang="en-US" sz="2800" dirty="0" smtClean="0"/>
@@ -4727,8 +4699,8 @@
         </p:nvSpPr>
         <p:spPr bwMode="auto">
           <a:xfrm>
-            <a:off x="32918400" y="23850600"/>
-            <a:ext cx="9829800" cy="4191000"/>
+            <a:off x="33005832" y="25532208"/>
+            <a:ext cx="9819436" cy="3109510"/>
           </a:xfrm>
           <a:prstGeom prst="rect">
             <a:avLst/>
@@ -4806,8 +4778,8 @@
         </p:nvSpPr>
         <p:spPr bwMode="auto">
           <a:xfrm>
-            <a:off x="32918400" y="15781040"/>
-            <a:ext cx="9829800" cy="7383760"/>
+            <a:off x="32995468" y="7746232"/>
+            <a:ext cx="9829800" cy="7764934"/>
           </a:xfrm>
           <a:prstGeom prst="rect">
             <a:avLst/>
@@ -4841,8 +4813,197 @@
                   <a:srgbClr val="CC3300"/>
                 </a:solidFill>
               </a:rPr>
-              <a:t>Conclusions and Future Work</a:t>
-            </a:r>
+              <a:t>Conclusions and Future </a:t>
+            </a:r>
+            <a:r>
+              <a:rPr lang="en-GB" sz="3600" b="1" dirty="0" smtClean="0">
+                <a:solidFill>
+                  <a:srgbClr val="CC3300"/>
+                </a:solidFill>
+              </a:rPr>
+              <a:t>Work</a:t>
+            </a:r>
+          </a:p>
+          <a:p>
+            <a:pPr marL="468000" lvl="1" indent="-381000">
+              <a:buClr>
+                <a:schemeClr val="tx1"/>
+              </a:buClr>
+              <a:buSzPct val="100000"/>
+              <a:buFont typeface="Arial" charset="0"/>
+              <a:buChar char="•"/>
+              <a:defRPr/>
+            </a:pPr>
+            <a:r>
+              <a:rPr lang="en-GB" sz="3200" dirty="0">
+                <a:latin typeface="Arial" pitchFamily="-108" charset="0"/>
+                <a:ea typeface="ＭＳ Ｐゴシック" pitchFamily="-108" charset="-128"/>
+                <a:cs typeface="ＭＳ Ｐゴシック" pitchFamily="-108" charset="-128"/>
+              </a:rPr>
+              <a:t>Provenance from script runs can be revealed graphically and made actionable (e.g., to yield customizable data lineage reports) via (1) simple YW user annotations, (2) linking runtime observables (e.g. </a:t>
+            </a:r>
+            <a:r>
+              <a:rPr lang="en-GB" sz="3200" dirty="0" err="1">
+                <a:latin typeface="Arial" pitchFamily="-108" charset="0"/>
+                <a:ea typeface="ＭＳ Ｐゴシック" pitchFamily="-108" charset="-128"/>
+                <a:cs typeface="ＭＳ Ｐゴシック" pitchFamily="-108" charset="-128"/>
+              </a:rPr>
+              <a:t>DataONE</a:t>
+            </a:r>
+            <a:r>
+              <a:rPr lang="en-GB" sz="3200" dirty="0">
+                <a:latin typeface="Arial" pitchFamily="-108" charset="0"/>
+                <a:ea typeface="ＭＳ Ｐゴシック" pitchFamily="-108" charset="-128"/>
+                <a:cs typeface="ＭＳ Ｐゴシック" pitchFamily="-108" charset="-128"/>
+              </a:rPr>
+              <a:t> </a:t>
+            </a:r>
+            <a:r>
+              <a:rPr lang="en-GB" sz="3200" dirty="0" err="1">
+                <a:latin typeface="Arial" pitchFamily="-108" charset="0"/>
+                <a:ea typeface="ＭＳ Ｐゴシック" pitchFamily="-108" charset="-128"/>
+                <a:cs typeface="ＭＳ Ｐゴシック" pitchFamily="-108" charset="-128"/>
+              </a:rPr>
+              <a:t>RunManager</a:t>
+            </a:r>
+            <a:r>
+              <a:rPr lang="en-GB" sz="3200" dirty="0">
+                <a:latin typeface="Arial" pitchFamily="-108" charset="0"/>
+                <a:ea typeface="ＭＳ Ｐゴシック" pitchFamily="-108" charset="-128"/>
+                <a:cs typeface="ＭＳ Ｐゴシック" pitchFamily="-108" charset="-128"/>
+              </a:rPr>
+              <a:t>, </a:t>
+            </a:r>
+            <a:r>
+              <a:rPr lang="en-GB" sz="3200" dirty="0" err="1">
+                <a:latin typeface="Arial" pitchFamily="-108" charset="0"/>
+                <a:ea typeface="ＭＳ Ｐゴシック" pitchFamily="-108" charset="-128"/>
+                <a:cs typeface="ＭＳ Ｐゴシック" pitchFamily="-108" charset="-128"/>
+              </a:rPr>
+              <a:t>ReproZip</a:t>
+            </a:r>
+            <a:r>
+              <a:rPr lang="en-GB" sz="3200" dirty="0">
+                <a:latin typeface="Arial" pitchFamily="-108" charset="0"/>
+                <a:ea typeface="ＭＳ Ｐゴシック" pitchFamily="-108" charset="-128"/>
+                <a:cs typeface="ＭＳ Ｐゴシック" pitchFamily="-108" charset="-128"/>
+              </a:rPr>
+              <a:t>, </a:t>
+            </a:r>
+            <a:r>
+              <a:rPr lang="en-GB" sz="3200" dirty="0" err="1">
+                <a:latin typeface="Arial" pitchFamily="-108" charset="0"/>
+                <a:ea typeface="ＭＳ Ｐゴシック" pitchFamily="-108" charset="-128"/>
+                <a:cs typeface="ＭＳ Ｐゴシック" pitchFamily="-108" charset="-128"/>
+              </a:rPr>
+              <a:t>noWorkflow</a:t>
+            </a:r>
+            <a:r>
+              <a:rPr lang="en-GB" sz="3200" dirty="0">
+                <a:latin typeface="Arial" pitchFamily="-108" charset="0"/>
+                <a:ea typeface="ＭＳ Ｐゴシック" pitchFamily="-108" charset="-128"/>
+                <a:cs typeface="ＭＳ Ｐゴシック" pitchFamily="-108" charset="-128"/>
+              </a:rPr>
+              <a:t>), and (3) sharing provenance </a:t>
+            </a:r>
+            <a:r>
+              <a:rPr lang="en-GB" sz="3200" dirty="0" err="1">
+                <a:latin typeface="Arial" pitchFamily="-108" charset="0"/>
+                <a:ea typeface="ＭＳ Ｐゴシック" pitchFamily="-108" charset="-128"/>
+                <a:cs typeface="ＭＳ Ｐゴシック" pitchFamily="-108" charset="-128"/>
+              </a:rPr>
+              <a:t>artifacts</a:t>
+            </a:r>
+            <a:r>
+              <a:rPr lang="en-GB" sz="3200" dirty="0">
+                <a:latin typeface="Arial" pitchFamily="-108" charset="0"/>
+                <a:ea typeface="ＭＳ Ｐゴシック" pitchFamily="-108" charset="-128"/>
+                <a:cs typeface="ＭＳ Ｐゴシック" pitchFamily="-108" charset="-128"/>
+              </a:rPr>
+              <a:t> and executable queries.  </a:t>
+            </a:r>
+          </a:p>
+          <a:p>
+            <a:pPr marL="468000" lvl="1" indent="-381000">
+              <a:buClr>
+                <a:schemeClr val="tx1"/>
+              </a:buClr>
+              <a:buSzPct val="100000"/>
+              <a:buFont typeface="Arial" charset="0"/>
+              <a:buChar char="•"/>
+              <a:defRPr/>
+            </a:pPr>
+            <a:r>
+              <a:rPr lang="en-GB" sz="3200" dirty="0">
+                <a:latin typeface="Arial" pitchFamily="-108" charset="0"/>
+                <a:ea typeface="ＭＳ Ｐゴシック" pitchFamily="-108" charset="-128"/>
+                <a:cs typeface="ＭＳ Ｐゴシック" pitchFamily="-108" charset="-128"/>
+              </a:rPr>
+              <a:t>Extend YW toolkit to support other (optional) workflow </a:t>
+            </a:r>
+            <a:r>
+              <a:rPr lang="en-GB" sz="3200" dirty="0" err="1">
+                <a:latin typeface="Arial" pitchFamily="-108" charset="0"/>
+                <a:ea typeface="ＭＳ Ｐゴシック" pitchFamily="-108" charset="-128"/>
+                <a:cs typeface="ＭＳ Ｐゴシック" pitchFamily="-108" charset="-128"/>
+              </a:rPr>
+              <a:t>modeling</a:t>
+            </a:r>
+            <a:r>
+              <a:rPr lang="en-GB" sz="3200" dirty="0">
+                <a:latin typeface="Arial" pitchFamily="-108" charset="0"/>
+                <a:ea typeface="ＭＳ Ｐゴシック" pitchFamily="-108" charset="-128"/>
+                <a:cs typeface="ＭＳ Ｐゴシック" pitchFamily="-108" charset="-128"/>
+              </a:rPr>
+              <a:t> constructs (e.g., simple control-flow to complement dataflow); to support graph pattern queries; to support project-level provenance.</a:t>
+            </a:r>
+          </a:p>
+          <a:p>
+            <a:pPr marL="468000" lvl="1" indent="-381000">
+              <a:buClr>
+                <a:schemeClr val="tx1"/>
+              </a:buClr>
+              <a:buSzPct val="100000"/>
+              <a:buFont typeface="Arial" charset="0"/>
+              <a:buChar char="•"/>
+              <a:defRPr/>
+            </a:pPr>
+            <a:r>
+              <a:rPr lang="en-GB" sz="3200" dirty="0">
+                <a:latin typeface="Arial" pitchFamily="-108" charset="0"/>
+                <a:ea typeface="ＭＳ Ｐゴシック" pitchFamily="-108" charset="-128"/>
+                <a:cs typeface="ＭＳ Ｐゴシック" pitchFamily="-108" charset="-128"/>
+              </a:rPr>
+              <a:t>Evolve </a:t>
+            </a:r>
+            <a:r>
+              <a:rPr lang="en-GB" sz="3200" dirty="0" err="1">
+                <a:latin typeface="Arial" pitchFamily="-108" charset="0"/>
+                <a:ea typeface="ＭＳ Ｐゴシック" pitchFamily="-108" charset="-128"/>
+                <a:cs typeface="ＭＳ Ｐゴシック" pitchFamily="-108" charset="-128"/>
+              </a:rPr>
+              <a:t>ProvONE</a:t>
+            </a:r>
+            <a:r>
+              <a:rPr lang="en-GB" sz="3200" dirty="0">
+                <a:latin typeface="Arial" pitchFamily="-108" charset="0"/>
+                <a:ea typeface="ＭＳ Ｐゴシック" pitchFamily="-108" charset="-128"/>
+                <a:cs typeface="ＭＳ Ｐゴシック" pitchFamily="-108" charset="-128"/>
+              </a:rPr>
+              <a:t> to support project-level provenance and graph queries.</a:t>
+            </a:r>
+          </a:p>
+          <a:p>
+            <a:pPr>
+              <a:spcBef>
+                <a:spcPct val="50000"/>
+              </a:spcBef>
+            </a:pPr>
+            <a:endParaRPr lang="en-GB" sz="3600" b="1" dirty="0" smtClean="0">
+              <a:solidFill>
+                <a:srgbClr val="CC3300"/>
+              </a:solidFill>
+            </a:endParaRPr>
           </a:p>
           <a:p>
             <a:endParaRPr lang="en-US" sz="2800" dirty="0"/>
@@ -4859,7 +5020,7 @@
         </p:nvSpPr>
         <p:spPr bwMode="auto">
           <a:xfrm>
-            <a:off x="1143000" y="19964400"/>
+            <a:off x="1143000" y="19979773"/>
             <a:ext cx="9829800" cy="11811000"/>
           </a:xfrm>
           <a:prstGeom prst="rect">
@@ -4889,89 +5050,130 @@
               </a:spcBef>
             </a:pPr>
             <a:r>
-              <a:rPr lang="en-GB" sz="3600" b="1" dirty="0" err="1" smtClean="0">
-                <a:solidFill>
-                  <a:srgbClr val="CC3300"/>
-                </a:solidFill>
-              </a:rPr>
-              <a:t>DataONE</a:t>
-            </a:r>
-            <a:r>
               <a:rPr lang="en-GB" sz="3600" b="1" dirty="0" smtClean="0">
                 <a:solidFill>
                   <a:srgbClr val="CC3300"/>
                 </a:solidFill>
               </a:rPr>
-              <a:t> Provenance </a:t>
-            </a:r>
-            <a:endParaRPr lang="en-US" sz="3600" dirty="0"/>
-          </a:p>
-          <a:p>
+              <a:t>Approach </a:t>
+            </a:r>
             <a:endParaRPr lang="en-US" sz="2800" b="1" dirty="0" smtClean="0"/>
           </a:p>
           <a:p>
             <a:r>
-              <a:rPr lang="en-US" sz="3200" b="1" dirty="0" smtClean="0"/>
-              <a:t>Phase </a:t>
+              <a:rPr lang="en-US" sz="3200" dirty="0"/>
+              <a:t>Simple </a:t>
+            </a:r>
+            <a:r>
+              <a:rPr lang="en-US" sz="3200" b="1" dirty="0" err="1"/>
+              <a:t>YesWorkflow</a:t>
             </a:r>
             <a:r>
               <a:rPr lang="en-US" sz="3200" b="1" dirty="0"/>
-              <a:t>II Goal</a:t>
+              <a:t> (YW) annotations</a:t>
             </a:r>
             <a:r>
               <a:rPr lang="en-US" sz="3200" dirty="0"/>
-              <a:t>: Facilitate reproducible </a:t>
-            </a:r>
-            <a:r>
-              <a:rPr lang="en-US" sz="3200" dirty="0" smtClean="0"/>
-              <a:t>science</a:t>
-            </a:r>
-          </a:p>
-          <a:p>
-            <a:pPr marL="468000" lvl="1" indent="-381000">
-              <a:buClr>
-                <a:schemeClr val="tx1"/>
-              </a:buClr>
-              <a:buSzPct val="100000"/>
+              <a:t> allow users to </a:t>
+            </a:r>
+            <a:r>
+              <a:rPr lang="en-US" sz="3200" b="1" dirty="0"/>
+              <a:t>reveal workflow </a:t>
+            </a:r>
+            <a:r>
+              <a:rPr lang="en-US" sz="3200" dirty="0"/>
+              <a:t>(prospective provenance graph)</a:t>
+            </a:r>
+            <a:r>
+              <a:rPr lang="en-US" sz="3200" b="1" dirty="0"/>
+              <a:t> implicit in scripts</a:t>
+            </a:r>
+            <a:r>
+              <a:rPr lang="en-US" sz="3200" dirty="0"/>
+              <a:t>. </a:t>
+            </a:r>
+          </a:p>
+          <a:p>
+            <a:pPr marL="457200" indent="-457200">
               <a:buFont typeface="Arial" charset="0"/>
               <a:buChar char="•"/>
-              <a:defRPr/>
-            </a:pPr>
-            <a:r>
-              <a:rPr lang="en-US" sz="3200" dirty="0">
-                <a:latin typeface="Arial" pitchFamily="-108" charset="0"/>
-                <a:ea typeface="ＭＳ Ｐゴシック" pitchFamily="-108" charset="-128"/>
-                <a:cs typeface="ＭＳ Ｐゴシック" pitchFamily="-108" charset="-128"/>
-              </a:rPr>
-              <a:t>t</a:t>
-            </a:r>
-            <a:r>
-              <a:rPr lang="en-US" sz="3200" dirty="0" smtClean="0">
-                <a:latin typeface="Arial" pitchFamily="-108" charset="0"/>
-                <a:ea typeface="ＭＳ Ｐゴシック" pitchFamily="-108" charset="-128"/>
-                <a:cs typeface="ＭＳ Ｐゴシック" pitchFamily="-108" charset="-128"/>
-              </a:rPr>
-              <a:t>rack </a:t>
-            </a:r>
-            <a:r>
-              <a:rPr lang="en-US" sz="3200" dirty="0">
-                <a:latin typeface="Arial" pitchFamily="-108" charset="0"/>
-                <a:ea typeface="ＭＳ Ｐゴシック" pitchFamily="-108" charset="-128"/>
-                <a:cs typeface="ＭＳ Ｐゴシック" pitchFamily="-108" charset="-128"/>
-              </a:rPr>
-              <a:t>data derivation history</a:t>
-            </a:r>
-          </a:p>
-          <a:p>
-            <a:pPr marL="468000" lvl="1" indent="-381000">
-              <a:buClr>
-                <a:schemeClr val="tx1"/>
-              </a:buClr>
-              <a:buSzPct val="100000"/>
+            </a:pPr>
+            <a:r>
+              <a:rPr lang="en-US" sz="3200" b="1" dirty="0" smtClean="0"/>
+              <a:t>Prospective </a:t>
+            </a:r>
+            <a:r>
+              <a:rPr lang="en-US" sz="3200" b="1" dirty="0"/>
+              <a:t>provenance queries to expose and test data dependencies</a:t>
+            </a:r>
+            <a:r>
+              <a:rPr lang="en-US" sz="3200" dirty="0"/>
+              <a:t> at the workflow </a:t>
+            </a:r>
+            <a:r>
+              <a:rPr lang="en-US" sz="3200" dirty="0" smtClean="0"/>
+              <a:t>level.</a:t>
+            </a:r>
+          </a:p>
+          <a:p>
+            <a:pPr marL="457200" indent="-457200">
               <a:buFont typeface="Arial" charset="0"/>
               <a:buChar char="•"/>
-              <a:defRPr/>
-            </a:pPr>
+            </a:pPr>
+            <a:r>
+              <a:rPr lang="en-US" sz="3200" b="1" dirty="0" smtClean="0"/>
+              <a:t>Hybrid </a:t>
+            </a:r>
+            <a:r>
+              <a:rPr lang="en-US" sz="3200" b="1" dirty="0"/>
+              <a:t>provenance queries</a:t>
+            </a:r>
+            <a:r>
+              <a:rPr lang="en-US" sz="3200" dirty="0"/>
+              <a:t> that </a:t>
+            </a:r>
+            <a:r>
+              <a:rPr lang="en-US" sz="3200" b="1" dirty="0"/>
+              <a:t>situate runtime observables</a:t>
+            </a:r>
+            <a:r>
+              <a:rPr lang="en-US" sz="3200" dirty="0"/>
+              <a:t> (retrospective provenance) in the overall </a:t>
+            </a:r>
+            <a:r>
+              <a:rPr lang="en-US" sz="3200" b="1" dirty="0"/>
+              <a:t>workflow</a:t>
+            </a:r>
+            <a:r>
+              <a:rPr lang="en-US" sz="3200" dirty="0"/>
+              <a:t>, yielding meaningful knowledge artifacts.  </a:t>
+            </a:r>
+          </a:p>
+          <a:p>
+            <a:pPr marL="457200" indent="-457200">
+              <a:buFont typeface="Arial" charset="0"/>
+              <a:buChar char="•"/>
+            </a:pPr>
+            <a:r>
+              <a:rPr lang="en-US" sz="3200" dirty="0"/>
+              <a:t>Easily </a:t>
+            </a:r>
+            <a:r>
+              <a:rPr lang="en-US" sz="3200" b="1" dirty="0"/>
+              <a:t>share comprehensible workflow graphs and customizable provenance reports for script runs</a:t>
+            </a:r>
+            <a:r>
+              <a:rPr lang="en-US" sz="3200" dirty="0"/>
+              <a:t>, along with data, code in scientific studies (“</a:t>
+            </a:r>
+            <a:r>
+              <a:rPr lang="en-US" sz="3200" i="1" dirty="0"/>
+              <a:t>provenance for self</a:t>
+            </a:r>
+            <a:r>
+              <a:rPr lang="en-US" sz="3200" dirty="0"/>
+              <a:t>”).</a:t>
+            </a:r>
             <a:endParaRPr lang="en-US" sz="3200" dirty="0">
               <a:latin typeface="Arial" pitchFamily="-108" charset="0"/>
               <a:ea typeface="ＭＳ Ｐゴシック" pitchFamily="-108" charset="-128"/>
@@ -4995,32 +5197,83 @@
                   <a:srgbClr val="CC3300"/>
                 </a:solidFill>
               </a:rPr>
-              <a:t>Provenance </a:t>
-            </a:r>
-            <a:r>
-              <a:rPr lang="en-GB" sz="3600" b="1" dirty="0">
-                <a:solidFill>
-                  <a:srgbClr val="CC3300"/>
-                </a:solidFill>
-              </a:rPr>
-              <a:t>Use Case</a:t>
-            </a:r>
-          </a:p>
-          <a:p>
-            <a:pPr marL="468000" lvl="1" indent="-381000">
-              <a:buClr>
-                <a:schemeClr val="tx1"/>
-              </a:buClr>
-              <a:buSzPct val="100000"/>
+              <a:t>Demo Queries</a:t>
+            </a:r>
+            <a:endParaRPr lang="en-GB" sz="3600" b="1" dirty="0">
+              <a:solidFill>
+                <a:srgbClr val="CC3300"/>
+              </a:solidFill>
+            </a:endParaRPr>
+          </a:p>
+          <a:p>
+            <a:pPr marL="457200" indent="-457200">
               <a:buFont typeface="Arial" charset="0"/>
               <a:buChar char="•"/>
-              <a:defRPr/>
-            </a:pPr>
-            <a:endParaRPr lang="en-US" sz="2800" dirty="0" smtClean="0">
-              <a:latin typeface="Arial" pitchFamily="-108" charset="0"/>
-              <a:ea typeface="ＭＳ Ｐゴシック" pitchFamily="-108" charset="-128"/>
-              <a:cs typeface="ＭＳ Ｐゴシック" pitchFamily="-108" charset="-128"/>
-            </a:endParaRPr>
+            </a:pPr>
+            <a:r>
+              <a:rPr lang="en-US" sz="3200" dirty="0" smtClean="0"/>
+              <a:t>Q1 (</a:t>
+            </a:r>
+            <a:r>
+              <a:rPr lang="en-US" sz="3200" b="1" dirty="0" smtClean="0"/>
+              <a:t>prospective query</a:t>
+            </a:r>
+            <a:r>
+              <a:rPr lang="en-US" sz="3200" dirty="0" smtClean="0"/>
+              <a:t>): </a:t>
+            </a:r>
+            <a:r>
+              <a:rPr lang="en-US" sz="3200" dirty="0"/>
+              <a:t>Render </a:t>
+            </a:r>
+            <a:r>
+              <a:rPr lang="en-US" sz="3200" dirty="0" smtClean="0"/>
+              <a:t>prospective </a:t>
+            </a:r>
+            <a:r>
+              <a:rPr lang="en-US" sz="3200" dirty="0"/>
+              <a:t>upstream </a:t>
+            </a:r>
+            <a:r>
+              <a:rPr lang="en-US" sz="3200" dirty="0" smtClean="0"/>
+              <a:t>subgraph of the YW model of the script for a given output data </a:t>
+            </a:r>
+            <a:r>
+              <a:rPr lang="en-US" sz="3200" dirty="0"/>
+              <a:t>product </a:t>
+            </a:r>
+            <a:r>
+              <a:rPr lang="en-US" sz="3200" dirty="0" smtClean="0"/>
+              <a:t>D.</a:t>
+            </a:r>
+            <a:endParaRPr lang="en-US" sz="3200" dirty="0"/>
+          </a:p>
+          <a:p>
+            <a:pPr marL="457200" indent="-457200">
+              <a:buFont typeface="Arial" charset="0"/>
+              <a:buChar char="•"/>
+            </a:pPr>
+            <a:r>
+              <a:rPr lang="en-US" sz="3200" dirty="0" smtClean="0"/>
+              <a:t>Q5 (</a:t>
+            </a:r>
+            <a:r>
+              <a:rPr lang="en-US" sz="3200" b="1" dirty="0" smtClean="0"/>
+              <a:t>hybrid query</a:t>
+            </a:r>
+            <a:r>
+              <a:rPr lang="en-US" sz="3200" dirty="0" smtClean="0"/>
+              <a:t>): Render retrospective graph with </a:t>
+            </a:r>
+            <a:r>
+              <a:rPr lang="en-US" sz="3200" dirty="0"/>
+              <a:t>with concrete </a:t>
+            </a:r>
+            <a:r>
+              <a:rPr lang="en-US" sz="3200" dirty="0" smtClean="0"/>
+              <a:t>filename for a given output  data product D.</a:t>
+            </a:r>
+            <a:endParaRPr lang="en-US" sz="3200" dirty="0"/>
           </a:p>
         </p:txBody>
       </p:sp>
@@ -5064,48 +5317,402 @@
               </a:spcBef>
             </a:pPr>
             <a:r>
-              <a:rPr lang="en-GB" sz="3600" b="1" dirty="0">
+              <a:rPr lang="en-GB" sz="3600" b="1" dirty="0" smtClean="0">
                 <a:solidFill>
                   <a:srgbClr val="CC3300"/>
                 </a:solidFill>
               </a:rPr>
-              <a:t>Introduction</a:t>
-            </a:r>
-            <a:endParaRPr lang="en-GB" sz="4000" b="1" dirty="0">
+              <a:t>Motivation</a:t>
+            </a:r>
+            <a:endParaRPr lang="en-US" sz="3200" dirty="0" smtClean="0"/>
+          </a:p>
+          <a:p>
+            <a:pPr marL="468000" lvl="1" indent="-381000">
+              <a:buClr>
+                <a:schemeClr val="tx1"/>
+              </a:buClr>
+              <a:buSzPct val="100000"/>
+              <a:buFont typeface="Arial" charset="0"/>
+              <a:buChar char="•"/>
+              <a:defRPr/>
+            </a:pPr>
+            <a:r>
+              <a:rPr lang="en-US" sz="3200" dirty="0">
+                <a:latin typeface="Arial" pitchFamily="-108" charset="0"/>
+                <a:ea typeface="ＭＳ Ｐゴシック" pitchFamily="-108" charset="-128"/>
+                <a:cs typeface="ＭＳ Ｐゴシック" pitchFamily="-108" charset="-128"/>
+              </a:rPr>
+              <a:t>Data- and Workflow-Provenance are crucial for </a:t>
+            </a:r>
+            <a:r>
+              <a:rPr lang="en-US" sz="3200" b="1" dirty="0">
+                <a:latin typeface="Arial" pitchFamily="-108" charset="0"/>
+                <a:ea typeface="ＭＳ Ｐゴシック" pitchFamily="-108" charset="-128"/>
+                <a:cs typeface="ＭＳ Ｐゴシック" pitchFamily="-108" charset="-128"/>
+              </a:rPr>
+              <a:t>transparency</a:t>
+            </a:r>
+            <a:r>
+              <a:rPr lang="en-US" sz="3200" dirty="0">
+                <a:latin typeface="Arial" pitchFamily="-108" charset="0"/>
+                <a:ea typeface="ＭＳ Ｐゴシック" pitchFamily="-108" charset="-128"/>
+                <a:cs typeface="ＭＳ Ｐゴシック" pitchFamily="-108" charset="-128"/>
+              </a:rPr>
+              <a:t> and </a:t>
+            </a:r>
+            <a:r>
+              <a:rPr lang="en-US" sz="3200" b="1" dirty="0">
+                <a:latin typeface="Arial" pitchFamily="-108" charset="0"/>
+                <a:ea typeface="ＭＳ Ｐゴシック" pitchFamily="-108" charset="-128"/>
+                <a:cs typeface="ＭＳ Ｐゴシック" pitchFamily="-108" charset="-128"/>
+              </a:rPr>
+              <a:t>reproducibility</a:t>
+            </a:r>
+            <a:r>
+              <a:rPr lang="en-US" sz="3200" dirty="0">
+                <a:latin typeface="Arial" pitchFamily="-108" charset="0"/>
+                <a:ea typeface="ＭＳ Ｐゴシック" pitchFamily="-108" charset="-128"/>
+                <a:cs typeface="ＭＳ Ｐゴシック" pitchFamily="-108" charset="-128"/>
+              </a:rPr>
+              <a:t> in computational and data-driven science.</a:t>
+            </a:r>
+          </a:p>
+          <a:p>
+            <a:pPr marL="468000" lvl="1" indent="-381000">
+              <a:buClr>
+                <a:schemeClr val="tx1"/>
+              </a:buClr>
+              <a:buSzPct val="100000"/>
+              <a:buFont typeface="Arial" charset="0"/>
+              <a:buChar char="•"/>
+              <a:defRPr/>
+            </a:pPr>
+            <a:r>
+              <a:rPr lang="en-US" sz="3200" dirty="0">
+                <a:latin typeface="Arial" pitchFamily="-108" charset="0"/>
+                <a:ea typeface="ＭＳ Ｐゴシック" pitchFamily="-108" charset="-128"/>
+                <a:cs typeface="ＭＳ Ｐゴシック" pitchFamily="-108" charset="-128"/>
+              </a:rPr>
+              <a:t>Scientific workflow systems (Kepler, </a:t>
+            </a:r>
+            <a:r>
+              <a:rPr lang="en-US" sz="3200" dirty="0" err="1">
+                <a:latin typeface="Arial" pitchFamily="-108" charset="0"/>
+                <a:ea typeface="ＭＳ Ｐゴシック" pitchFamily="-108" charset="-128"/>
+                <a:cs typeface="ＭＳ Ｐゴシック" pitchFamily="-108" charset="-128"/>
+              </a:rPr>
+              <a:t>Taverna</a:t>
+            </a:r>
+            <a:r>
+              <a:rPr lang="en-US" sz="3200" dirty="0">
+                <a:latin typeface="Arial" pitchFamily="-108" charset="0"/>
+                <a:ea typeface="ＭＳ Ｐゴシック" pitchFamily="-108" charset="-128"/>
+                <a:cs typeface="ＭＳ Ｐゴシック" pitchFamily="-108" charset="-128"/>
+              </a:rPr>
+              <a:t>, …) provide both </a:t>
+            </a:r>
+            <a:r>
+              <a:rPr lang="en-US" sz="3200" b="1" dirty="0">
+                <a:latin typeface="Arial" pitchFamily="-108" charset="0"/>
+                <a:ea typeface="ＭＳ Ｐゴシック" pitchFamily="-108" charset="-128"/>
+                <a:cs typeface="ＭＳ Ｐゴシック" pitchFamily="-108" charset="-128"/>
+              </a:rPr>
+              <a:t>prospective provenance </a:t>
+            </a:r>
+            <a:r>
+              <a:rPr lang="en-US" sz="3200" dirty="0">
+                <a:latin typeface="Arial" pitchFamily="-108" charset="0"/>
+                <a:ea typeface="ＭＳ Ｐゴシック" pitchFamily="-108" charset="-128"/>
+                <a:cs typeface="ＭＳ Ｐゴシック" pitchFamily="-108" charset="-128"/>
+              </a:rPr>
+              <a:t>(the workflow graph) and </a:t>
+            </a:r>
+            <a:r>
+              <a:rPr lang="en-US" sz="3200" b="1" dirty="0">
+                <a:latin typeface="Arial" pitchFamily="-108" charset="0"/>
+                <a:ea typeface="ＭＳ Ｐゴシック" pitchFamily="-108" charset="-128"/>
+                <a:cs typeface="ＭＳ Ｐゴシック" pitchFamily="-108" charset="-128"/>
+              </a:rPr>
+              <a:t>retrospective</a:t>
+            </a:r>
+            <a:r>
+              <a:rPr lang="en-US" sz="3200" dirty="0">
+                <a:latin typeface="Arial" pitchFamily="-108" charset="0"/>
+                <a:ea typeface="ＭＳ Ｐゴシック" pitchFamily="-108" charset="-128"/>
+                <a:cs typeface="ＭＳ Ｐゴシック" pitchFamily="-108" charset="-128"/>
+              </a:rPr>
+              <a:t> </a:t>
+            </a:r>
+            <a:r>
+              <a:rPr lang="en-US" sz="3200" b="1" dirty="0"/>
+              <a:t>provenance </a:t>
+            </a:r>
+            <a:r>
+              <a:rPr lang="en-US" sz="3200" dirty="0"/>
+              <a:t>(runtime observables</a:t>
+            </a:r>
+            <a:r>
+              <a:rPr lang="en-US" sz="3200" dirty="0" smtClean="0"/>
+              <a:t>).</a:t>
+            </a:r>
+            <a:endParaRPr lang="en-US" sz="3600" b="1" dirty="0">
               <a:solidFill>
                 <a:srgbClr val="CC3300"/>
               </a:solidFill>
             </a:endParaRPr>
           </a:p>
           <a:p>
-            <a:r>
-              <a:rPr lang="en-US" sz="2800" b="1" dirty="0"/>
-              <a:t> </a:t>
-            </a:r>
-            <a:endParaRPr lang="en-US" sz="2800" dirty="0"/>
-          </a:p>
-          <a:p>
-            <a:r>
-              <a:rPr lang="en-US" sz="3200" dirty="0"/>
-              <a:t>Scientific workflow </a:t>
-            </a:r>
-            <a:r>
-              <a:rPr lang="en-US" sz="3200" b="1" i="1" dirty="0"/>
-              <a:t>provenance</a:t>
-            </a:r>
-            <a:r>
-              <a:rPr lang="en-US" sz="3200" dirty="0"/>
+            <a:pPr marL="87000" lvl="1" indent="0">
+              <a:buClr>
+                <a:schemeClr val="tx1"/>
+              </a:buClr>
+              <a:buSzPct val="100000"/>
+              <a:defRPr/>
+            </a:pPr>
+            <a:r>
+              <a:rPr lang="en-US" sz="3600" b="1" dirty="0" smtClean="0">
+                <a:solidFill>
+                  <a:srgbClr val="CC3300"/>
+                </a:solidFill>
+              </a:rPr>
+              <a:t>Challenges</a:t>
+            </a:r>
+          </a:p>
+          <a:p>
+            <a:pPr marL="468000" lvl="1" indent="-381000">
+              <a:buClr>
+                <a:schemeClr val="tx1"/>
+              </a:buClr>
+              <a:buSzPct val="100000"/>
+              <a:buFont typeface="Arial" charset="0"/>
+              <a:buChar char="•"/>
+              <a:defRPr/>
+            </a:pPr>
+            <a:r>
+              <a:rPr lang="en-US" sz="3200" dirty="0">
+                <a:latin typeface="Arial" pitchFamily="-108" charset="0"/>
+                <a:ea typeface="ＭＳ Ｐゴシック" pitchFamily="-108" charset="-128"/>
+                <a:cs typeface="ＭＳ Ｐゴシック" pitchFamily="-108" charset="-128"/>
+              </a:rPr>
+              <a:t>Most computational analyses and workflows are conducted using </a:t>
+            </a:r>
+            <a:r>
+              <a:rPr lang="en-US" sz="3200" b="1" dirty="0">
+                <a:latin typeface="Arial" pitchFamily="-108" charset="0"/>
+                <a:ea typeface="ＭＳ Ｐゴシック" pitchFamily="-108" charset="-128"/>
+                <a:cs typeface="ＭＳ Ｐゴシック" pitchFamily="-108" charset="-128"/>
+              </a:rPr>
+              <a:t>scripts</a:t>
+            </a:r>
+            <a:r>
+              <a:rPr lang="en-US" sz="3200" dirty="0">
+                <a:latin typeface="Arial" pitchFamily="-108" charset="0"/>
+                <a:ea typeface="ＭＳ Ｐゴシック" pitchFamily="-108" charset="-128"/>
+                <a:cs typeface="ＭＳ Ｐゴシック" pitchFamily="-108" charset="-128"/>
+              </a:rPr>
+              <a:t> (Python, R, MATLAB,  bash, …) rather than workflow systems.</a:t>
+            </a:r>
+          </a:p>
+          <a:p>
+            <a:pPr marL="468000" lvl="1" indent="-381000">
+              <a:buClr>
+                <a:schemeClr val="tx1"/>
+              </a:buClr>
+              <a:buSzPct val="100000"/>
+              <a:buFont typeface="Arial" charset="0"/>
+              <a:buChar char="•"/>
+              <a:defRPr/>
+            </a:pPr>
+            <a:r>
+              <a:rPr lang="en-US" sz="3200" b="1" dirty="0">
+                <a:latin typeface="Arial" pitchFamily="-108" charset="0"/>
+                <a:ea typeface="ＭＳ Ｐゴシック" pitchFamily="-108" charset="-128"/>
+                <a:cs typeface="ＭＳ Ｐゴシック" pitchFamily="-108" charset="-128"/>
+              </a:rPr>
+              <a:t>Retrospective Provenance Observables</a:t>
+            </a:r>
+            <a:r>
+              <a:rPr lang="en-US" sz="3200" dirty="0">
+                <a:latin typeface="Arial" pitchFamily="-108" charset="0"/>
+                <a:ea typeface="ＭＳ Ｐゴシック" pitchFamily="-108" charset="-128"/>
+                <a:cs typeface="ＭＳ Ｐゴシック" pitchFamily="-108" charset="-128"/>
+              </a:rPr>
+              <a:t>, e.g., from </a:t>
+            </a:r>
+            <a:r>
+              <a:rPr lang="en-US" sz="3200" dirty="0" err="1">
+                <a:latin typeface="Arial" pitchFamily="-108" charset="0"/>
+                <a:ea typeface="ＭＳ Ｐゴシック" pitchFamily="-108" charset="-128"/>
+                <a:cs typeface="ＭＳ Ｐゴシック" pitchFamily="-108" charset="-128"/>
+              </a:rPr>
+              <a:t>DataONE</a:t>
+            </a:r>
+            <a:r>
+              <a:rPr lang="en-US" sz="3200" dirty="0">
+                <a:latin typeface="Arial" pitchFamily="-108" charset="0"/>
+                <a:ea typeface="ＭＳ Ｐゴシック" pitchFamily="-108" charset="-128"/>
+                <a:cs typeface="ＭＳ Ｐゴシック" pitchFamily="-108" charset="-128"/>
+              </a:rPr>
               <a:t> </a:t>
             </a:r>
             <a:r>
-              <a:rPr lang="en-US" sz="3200" dirty="0" smtClean="0"/>
-              <a:t>can </a:t>
-            </a:r>
-            <a:r>
-              <a:rPr lang="en-US" sz="3200" dirty="0" smtClean="0"/>
-              <a:t>help</a:t>
-            </a:r>
-            <a:endParaRPr lang="en-US" sz="3200" dirty="0"/>
+              <a:rPr lang="en-US" sz="3200" dirty="0" err="1">
+                <a:latin typeface="Arial" pitchFamily="-108" charset="0"/>
+                <a:ea typeface="ＭＳ Ｐゴシック" pitchFamily="-108" charset="-128"/>
+                <a:cs typeface="ＭＳ Ｐゴシック" pitchFamily="-108" charset="-128"/>
+              </a:rPr>
+              <a:t>RunManagers</a:t>
+            </a:r>
+            <a:r>
+              <a:rPr lang="en-US" sz="3200" dirty="0">
+                <a:latin typeface="Arial" pitchFamily="-108" charset="0"/>
+                <a:ea typeface="ＭＳ Ｐゴシック" pitchFamily="-108" charset="-128"/>
+                <a:cs typeface="ＭＳ Ｐゴシック" pitchFamily="-108" charset="-128"/>
+              </a:rPr>
+              <a:t> (file-level), </a:t>
+            </a:r>
+            <a:r>
+              <a:rPr lang="en-US" sz="3200" dirty="0" err="1">
+                <a:latin typeface="Arial" pitchFamily="-108" charset="0"/>
+                <a:ea typeface="ＭＳ Ｐゴシック" pitchFamily="-108" charset="-128"/>
+                <a:cs typeface="ＭＳ Ｐゴシック" pitchFamily="-108" charset="-128"/>
+              </a:rPr>
+              <a:t>ReproZip</a:t>
+            </a:r>
+            <a:r>
+              <a:rPr lang="en-US" sz="3200" dirty="0">
+                <a:latin typeface="Arial" pitchFamily="-108" charset="0"/>
+                <a:ea typeface="ＭＳ Ｐゴシック" pitchFamily="-108" charset="-128"/>
+                <a:cs typeface="ＭＳ Ｐゴシック" pitchFamily="-108" charset="-128"/>
+              </a:rPr>
+              <a:t> (OS-level), or </a:t>
+            </a:r>
+            <a:r>
+              <a:rPr lang="en-US" sz="3200" dirty="0" err="1">
+                <a:latin typeface="Arial" pitchFamily="-108" charset="0"/>
+                <a:ea typeface="ＭＳ Ｐゴシック" pitchFamily="-108" charset="-128"/>
+                <a:cs typeface="ＭＳ Ｐゴシック" pitchFamily="-108" charset="-128"/>
+              </a:rPr>
+              <a:t>noWorkflow</a:t>
+            </a:r>
+            <a:r>
+              <a:rPr lang="en-US" sz="3200" dirty="0">
+                <a:latin typeface="Arial" pitchFamily="-108" charset="0"/>
+                <a:ea typeface="ＭＳ Ｐゴシック" pitchFamily="-108" charset="-128"/>
+                <a:cs typeface="ＭＳ Ｐゴシック" pitchFamily="-108" charset="-128"/>
+              </a:rPr>
+              <a:t> (Python code-level) only yield </a:t>
+            </a:r>
+            <a:r>
+              <a:rPr lang="en-US" sz="3200" b="1" dirty="0">
+                <a:latin typeface="Arial" pitchFamily="-108" charset="0"/>
+                <a:ea typeface="ＭＳ Ｐゴシック" pitchFamily="-108" charset="-128"/>
+                <a:cs typeface="ＭＳ Ｐゴシック" pitchFamily="-108" charset="-128"/>
+              </a:rPr>
+              <a:t>isolated fragments</a:t>
+            </a:r>
+            <a:r>
+              <a:rPr lang="en-US" sz="3200" dirty="0">
+                <a:latin typeface="Arial" pitchFamily="-108" charset="0"/>
+                <a:ea typeface="ＭＳ Ｐゴシック" pitchFamily="-108" charset="-128"/>
+                <a:cs typeface="ＭＳ Ｐゴシック" pitchFamily="-108" charset="-128"/>
+              </a:rPr>
+              <a:t> of the overall data lineage and processing history.</a:t>
+            </a:r>
+          </a:p>
+          <a:p>
+            <a:pPr marL="468000" lvl="1" indent="-381000">
+              <a:buClr>
+                <a:schemeClr val="tx1"/>
+              </a:buClr>
+              <a:buSzPct val="100000"/>
+              <a:buFont typeface="Arial" charset="0"/>
+              <a:buChar char="•"/>
+              <a:defRPr/>
+            </a:pPr>
+            <a:r>
+              <a:rPr lang="en-US" sz="3200" b="1" dirty="0">
+                <a:latin typeface="Arial" pitchFamily="-108" charset="0"/>
+                <a:ea typeface="ＭＳ Ｐゴシック" pitchFamily="-108" charset="-128"/>
+                <a:cs typeface="ＭＳ Ｐゴシック" pitchFamily="-108" charset="-128"/>
+              </a:rPr>
+              <a:t>Prospective Provenance </a:t>
+            </a:r>
+            <a:r>
+              <a:rPr lang="en-US" sz="3200" dirty="0">
+                <a:latin typeface="Arial" pitchFamily="-108" charset="0"/>
+                <a:ea typeface="ＭＳ Ｐゴシック" pitchFamily="-108" charset="-128"/>
+                <a:cs typeface="ＭＳ Ｐゴシック" pitchFamily="-108" charset="-128"/>
+              </a:rPr>
+              <a:t>could be used to link and contextualize fragments into a meaningful and comprehensible workflow, but </a:t>
+            </a:r>
+            <a:r>
+              <a:rPr lang="en-US" sz="3200" b="1" dirty="0">
+                <a:latin typeface="Arial" pitchFamily="-108" charset="0"/>
+                <a:ea typeface="ＭＳ Ｐゴシック" pitchFamily="-108" charset="-128"/>
+                <a:cs typeface="ＭＳ Ｐゴシック" pitchFamily="-108" charset="-128"/>
+              </a:rPr>
+              <a:t>scripts alone do not reveal the underlying workflow graph</a:t>
+            </a:r>
+            <a:r>
+              <a:rPr lang="en-US" sz="3200" dirty="0">
+                <a:latin typeface="Arial" pitchFamily="-108" charset="0"/>
+                <a:ea typeface="ＭＳ Ｐゴシック" pitchFamily="-108" charset="-128"/>
+                <a:cs typeface="ＭＳ Ｐゴシック" pitchFamily="-108" charset="-128"/>
+              </a:rPr>
+              <a:t>.</a:t>
+            </a:r>
+          </a:p>
+          <a:p>
+            <a:pPr marL="468000" lvl="1" indent="-381000">
+              <a:buClr>
+                <a:schemeClr val="tx1"/>
+              </a:buClr>
+              <a:buSzPct val="100000"/>
+              <a:buFont typeface="Arial" charset="0"/>
+              <a:buChar char="•"/>
+              <a:defRPr/>
+            </a:pPr>
+            <a:r>
+              <a:rPr lang="en-US" sz="3200" dirty="0">
+                <a:latin typeface="Arial" pitchFamily="-108" charset="0"/>
+                <a:ea typeface="ＭＳ Ｐゴシック" pitchFamily="-108" charset="-128"/>
+                <a:cs typeface="ＭＳ Ｐゴシック" pitchFamily="-108" charset="-128"/>
+              </a:rPr>
+              <a:t>Provenance (like other metadata) appears to be </a:t>
+            </a:r>
+            <a:r>
+              <a:rPr lang="en-US" sz="3200" b="1" dirty="0">
+                <a:latin typeface="Arial" pitchFamily="-108" charset="0"/>
+                <a:ea typeface="ＭＳ Ｐゴシック" pitchFamily="-108" charset="-128"/>
+                <a:cs typeface="ＭＳ Ｐゴシック" pitchFamily="-108" charset="-128"/>
+              </a:rPr>
+              <a:t>rarely actionable or immediately useful</a:t>
+            </a:r>
+            <a:r>
+              <a:rPr lang="en-US" sz="3200" dirty="0">
+                <a:latin typeface="Arial" pitchFamily="-108" charset="0"/>
+                <a:ea typeface="ＭＳ Ｐゴシック" pitchFamily="-108" charset="-128"/>
+                <a:cs typeface="ＭＳ Ｐゴシック" pitchFamily="-108" charset="-128"/>
+              </a:rPr>
+              <a:t> for those who are expected to provide it (provenance is “</a:t>
+            </a:r>
+            <a:r>
+              <a:rPr lang="en-US" sz="3200" i="1" dirty="0">
+                <a:latin typeface="Arial" pitchFamily="-108" charset="0"/>
+                <a:ea typeface="ＭＳ Ｐゴシック" pitchFamily="-108" charset="-128"/>
+                <a:cs typeface="ＭＳ Ｐゴシック" pitchFamily="-108" charset="-128"/>
+              </a:rPr>
+              <a:t>for others</a:t>
+            </a:r>
+            <a:r>
+              <a:rPr lang="en-US" sz="3200" dirty="0">
+                <a:latin typeface="Arial" pitchFamily="-108" charset="0"/>
+                <a:ea typeface="ＭＳ Ｐゴシック" pitchFamily="-108" charset="-128"/>
+                <a:cs typeface="ＭＳ Ｐゴシック" pitchFamily="-108" charset="-128"/>
+              </a:rPr>
+              <a:t>”).</a:t>
+            </a:r>
           </a:p>
         </p:txBody>
       </p:sp>
@@ -5119,8 +5726,8 @@
         </p:nvSpPr>
         <p:spPr bwMode="auto">
           <a:xfrm>
-            <a:off x="11693216" y="4976020"/>
-            <a:ext cx="9829800" cy="27051000"/>
+            <a:off x="11504440" y="4824392"/>
+            <a:ext cx="10108368" cy="14363542"/>
           </a:xfrm>
           <a:prstGeom prst="rect">
             <a:avLst/>
@@ -5150,10 +5757,17 @@
               <a:defRPr/>
             </a:pPr>
             <a:r>
-              <a:rPr lang="en-US" sz="3200" dirty="0" smtClean="0"/>
-              <a:t>. </a:t>
-            </a:r>
-            <a:endParaRPr lang="en-US" sz="3200" dirty="0">
+              <a:rPr lang="en-GB" sz="3600" b="1" dirty="0" smtClean="0">
+                <a:solidFill>
+                  <a:srgbClr val="CC3300"/>
+                </a:solidFill>
+              </a:rPr>
+              <a:t>Fine-Grained Prospective Provenance</a:t>
+            </a:r>
+            <a:endParaRPr lang="en-US" sz="3600" b="1" dirty="0">
+              <a:solidFill>
+                <a:srgbClr val="FF0000"/>
+              </a:solidFill>
               <a:latin typeface="Arial" pitchFamily="-108" charset="0"/>
               <a:ea typeface="ＭＳ Ｐゴシック" pitchFamily="-108" charset="-128"/>
               <a:cs typeface="ＭＳ Ｐゴシック" pitchFamily="-108" charset="-128"/>
@@ -5171,8 +5785,8 @@
         </p:nvSpPr>
         <p:spPr bwMode="auto">
           <a:xfrm>
-            <a:off x="22326600" y="4724400"/>
-            <a:ext cx="9829800" cy="27051000"/>
+            <a:off x="22089616" y="4824392"/>
+            <a:ext cx="10297144" cy="14299104"/>
           </a:xfrm>
           <a:prstGeom prst="rect">
             <a:avLst/>
@@ -5195,7 +5809,28 @@
           </a:bodyPr>
           <a:lstStyle/>
           <a:p>
-            <a:endParaRPr lang="en-US" sz="2800" dirty="0" smtClean="0"/>
+            <a:pPr marL="381000" indent="-381000">
+              <a:spcBef>
+                <a:spcPct val="50000"/>
+              </a:spcBef>
+              <a:defRPr/>
+            </a:pPr>
+            <a:r>
+              <a:rPr lang="en-GB" sz="3600" b="1" dirty="0" smtClean="0">
+                <a:solidFill>
+                  <a:srgbClr val="CC3300"/>
+                </a:solidFill>
+              </a:rPr>
+              <a:t>Coarse and Fine-Grained Observations of Runs</a:t>
+            </a:r>
+            <a:endParaRPr lang="en-US" sz="3600" b="1" dirty="0">
+              <a:solidFill>
+                <a:srgbClr val="FF0000"/>
+              </a:solidFill>
+              <a:latin typeface="Arial" pitchFamily="-108" charset="0"/>
+              <a:ea typeface="ＭＳ Ｐゴシック" pitchFamily="-108" charset="-128"/>
+              <a:cs typeface="ＭＳ Ｐゴシック" pitchFamily="-108" charset="-128"/>
+            </a:endParaRPr>
           </a:p>
         </p:txBody>
       </p:sp>
@@ -5210,7 +5845,7 @@
         <p:spPr bwMode="auto">
           <a:xfrm>
             <a:off x="32918400" y="4778934"/>
-            <a:ext cx="9829800" cy="10294640"/>
+            <a:ext cx="9906868" cy="2624030"/>
           </a:xfrm>
           <a:prstGeom prst="rect">
             <a:avLst/>
@@ -5233,7 +5868,89 @@
           </a:bodyPr>
           <a:lstStyle/>
           <a:p>
-            <a:endParaRPr lang="en-US" sz="2800" b="1" dirty="0" smtClean="0"/>
+            <a:r>
+              <a:rPr lang="en-GB" sz="2800" b="1" dirty="0" smtClean="0">
+                <a:solidFill>
+                  <a:srgbClr val="CC3300"/>
+                </a:solidFill>
+              </a:rPr>
+              <a:t>Other </a:t>
+            </a:r>
+            <a:r>
+              <a:rPr lang="en-GB" sz="2800" b="1" smtClean="0">
+                <a:solidFill>
+                  <a:srgbClr val="CC3300"/>
+                </a:solidFill>
+              </a:rPr>
+              <a:t>Use Cases</a:t>
+            </a:r>
+            <a:endParaRPr lang="en-GB" sz="2800" b="1" dirty="0">
+              <a:solidFill>
+                <a:srgbClr val="CC3300"/>
+              </a:solidFill>
+            </a:endParaRPr>
+          </a:p>
+          <a:p>
+            <a:pPr marL="457200" lvl="1" indent="-457200">
+              <a:buFont typeface="Arial" charset="0"/>
+              <a:buChar char="•"/>
+            </a:pPr>
+            <a:r>
+              <a:rPr lang="en-US" sz="3200" dirty="0" smtClean="0">
+                <a:latin typeface="Arial" pitchFamily="-108" charset="0"/>
+                <a:ea typeface="ＭＳ Ｐゴシック" pitchFamily="-108" charset="-128"/>
+                <a:cs typeface="ＭＳ Ｐゴシック" pitchFamily="-108" charset="-128"/>
+              </a:rPr>
+              <a:t>LIGO</a:t>
+            </a:r>
+          </a:p>
+          <a:p>
+            <a:pPr marL="457200" lvl="1" indent="-457200">
+              <a:buFont typeface="Arial" charset="0"/>
+              <a:buChar char="•"/>
+            </a:pPr>
+            <a:r>
+              <a:rPr lang="en-US" sz="3200" dirty="0" err="1" smtClean="0">
+                <a:latin typeface="Arial" pitchFamily="-108" charset="0"/>
+                <a:ea typeface="ＭＳ Ｐゴシック" pitchFamily="-108" charset="-128"/>
+                <a:cs typeface="ＭＳ Ｐゴシック" pitchFamily="-108" charset="-128"/>
+              </a:rPr>
+              <a:t>Priyaa’s</a:t>
+            </a:r>
+            <a:r>
+              <a:rPr lang="en-US" sz="3200" dirty="0" smtClean="0">
+                <a:latin typeface="Arial" pitchFamily="-108" charset="0"/>
+                <a:ea typeface="ＭＳ Ｐゴシック" pitchFamily="-108" charset="-128"/>
+                <a:cs typeface="ＭＳ Ｐゴシック" pitchFamily="-108" charset="-128"/>
+              </a:rPr>
+              <a:t> figures</a:t>
+            </a:r>
+          </a:p>
+          <a:p>
+            <a:pPr marL="457200" lvl="1" indent="-457200">
+              <a:buFont typeface="Arial" charset="0"/>
+              <a:buChar char="•"/>
+            </a:pPr>
+            <a:r>
+              <a:rPr lang="en-US" sz="3200" dirty="0" smtClean="0">
+                <a:latin typeface="Arial" pitchFamily="-108" charset="0"/>
+                <a:ea typeface="ＭＳ Ｐゴシック" pitchFamily="-108" charset="-128"/>
+                <a:cs typeface="ＭＳ Ｐゴシック" pitchFamily="-108" charset="-128"/>
+              </a:rPr>
+              <a:t>Simulate Data Collection</a:t>
+            </a:r>
+            <a:endParaRPr lang="en-GB" sz="2800" b="1" dirty="0" smtClean="0">
+              <a:solidFill>
+                <a:srgbClr val="CC3300"/>
+              </a:solidFill>
+            </a:endParaRPr>
+          </a:p>
+          <a:p>
+            <a:endParaRPr lang="en-GB" sz="2800" b="1" dirty="0" smtClean="0">
+              <a:solidFill>
+                <a:srgbClr val="CC3300"/>
+              </a:solidFill>
+            </a:endParaRPr>
           </a:p>
           <a:p>
             <a:endParaRPr lang="en-US" sz="2800" dirty="0"/>
@@ -5250,7 +5967,7 @@
         </p:nvSpPr>
         <p:spPr bwMode="auto">
           <a:xfrm>
-            <a:off x="32918400" y="28803600"/>
+            <a:off x="33034832" y="28803600"/>
             <a:ext cx="9829800" cy="2971800"/>
           </a:xfrm>
           <a:prstGeom prst="rect">
@@ -5300,7 +6017,7 @@
         </p:blipFill>
         <p:spPr bwMode="auto">
           <a:xfrm>
-            <a:off x="38440665" y="25392001"/>
+            <a:off x="38569433" y="26981946"/>
             <a:ext cx="1846984" cy="1785848"/>
           </a:xfrm>
           <a:prstGeom prst="rect">
@@ -5337,7 +6054,7 @@
         </p:blipFill>
         <p:spPr>
           <a:xfrm>
-            <a:off x="36151309" y="25583672"/>
+            <a:off x="35954643" y="27003456"/>
             <a:ext cx="1700608" cy="1628394"/>
           </a:xfrm>
           <a:prstGeom prst="rect">
@@ -5427,7 +6144,7 @@
         </p:blipFill>
         <p:spPr>
           <a:xfrm>
-            <a:off x="34985448" y="1571164"/>
+            <a:off x="34985448" y="1859196"/>
             <a:ext cx="8778576" cy="2070612"/>
           </a:xfrm>
           <a:prstGeom prst="rect">
@@ -5475,7 +6192,7 @@
         </p:blipFill>
         <p:spPr>
           <a:xfrm>
-            <a:off x="33250856" y="26058340"/>
+            <a:off x="33250856" y="27769187"/>
             <a:ext cx="2229447" cy="782365"/>
           </a:xfrm>
           <a:prstGeom prst="rect">
@@ -5483,54 +6200,814 @@
           </a:prstGeom>
         </p:spPr>
       </p:pic>
-      <p:pic>
-        <p:nvPicPr>
-          <p:cNvPr id="22" name="Picture 21"/>
-          <p:cNvPicPr>
-            <a:picLocks noChangeAspect="1"/>
-          </p:cNvPicPr>
+      <p:sp>
+        <p:nvSpPr>
+          <p:cNvPr id="24" name="Rectangle 51"/>
+          <p:cNvSpPr>
+            <a:spLocks noChangeArrowheads="1"/>
+          </p:cNvSpPr>
           <p:nvPr/>
-        </p:nvPicPr>
-        <p:blipFill>
-          <a:blip r:embed="rId10"/>
-          <a:stretch>
-            <a:fillRect/>
-          </a:stretch>
-        </p:blipFill>
-        <p:spPr>
+        </p:nvSpPr>
+        <p:spPr bwMode="auto">
           <a:xfrm>
-            <a:off x="8192072" y="25666981"/>
-            <a:ext cx="869678" cy="657315"/>
+            <a:off x="11504440" y="19736390"/>
+            <a:ext cx="20882320" cy="2495772"/>
           </a:xfrm>
           <a:prstGeom prst="rect">
             <a:avLst/>
           </a:prstGeom>
+          <a:solidFill>
+            <a:schemeClr val="bg1"/>
+          </a:solidFill>
+          <a:ln w="9525">
+            <a:noFill/>
+            <a:miter lim="800000"/>
+            <a:headEnd/>
+            <a:tailEnd/>
+          </a:ln>
         </p:spPr>
-      </p:pic>
-      <p:pic>
-        <p:nvPicPr>
-          <p:cNvPr id="23" name="Picture 22"/>
-          <p:cNvPicPr>
-            <a:picLocks noChangeAspect="1"/>
-          </p:cNvPicPr>
+        <p:txBody>
+          <a:bodyPr lIns="360000" tIns="360000" rIns="360000" bIns="360000">
+            <a:prstTxWarp prst="textNoShape">
+              <a:avLst/>
+            </a:prstTxWarp>
+          </a:bodyPr>
+          <a:lstStyle/>
+          <a:p>
+            <a:pPr marL="381000" indent="-381000">
+              <a:spcBef>
+                <a:spcPct val="50000"/>
+              </a:spcBef>
+              <a:defRPr/>
+            </a:pPr>
+            <a:r>
+              <a:rPr lang="en-GB" sz="3600" b="1" dirty="0" smtClean="0">
+                <a:solidFill>
+                  <a:srgbClr val="CC3300"/>
+                </a:solidFill>
+              </a:rPr>
+              <a:t>Run Reconstruction</a:t>
+            </a:r>
+          </a:p>
+          <a:p>
+            <a:pPr marL="468000" lvl="1" indent="-381000">
+              <a:buClr>
+                <a:schemeClr val="tx1"/>
+              </a:buClr>
+              <a:buSzPct val="100000"/>
+              <a:buFont typeface="Arial" charset="0"/>
+              <a:buChar char="•"/>
+              <a:defRPr/>
+            </a:pPr>
+            <a:r>
+              <a:rPr lang="en-US" sz="3200" b="1" dirty="0" smtClean="0">
+                <a:latin typeface="Arial" pitchFamily="-108" charset="0"/>
+                <a:ea typeface="ＭＳ Ｐゴシック" pitchFamily="-108" charset="-128"/>
+                <a:cs typeface="ＭＳ Ｐゴシック" pitchFamily="-108" charset="-128"/>
+              </a:rPr>
+              <a:t>YW recon </a:t>
+            </a:r>
+          </a:p>
+          <a:p>
+            <a:pPr marL="468000" lvl="1" indent="-381000">
+              <a:buClr>
+                <a:schemeClr val="tx1"/>
+              </a:buClr>
+              <a:buSzPct val="100000"/>
+              <a:buFont typeface="Arial" charset="0"/>
+              <a:buChar char="•"/>
+              <a:defRPr/>
+            </a:pPr>
+            <a:r>
+              <a:rPr lang="en-US" sz="3200" b="1" dirty="0" smtClean="0">
+                <a:latin typeface="Arial" pitchFamily="-108" charset="0"/>
+                <a:ea typeface="ＭＳ Ｐゴシック" pitchFamily="-108" charset="-128"/>
+                <a:cs typeface="ＭＳ Ｐゴシック" pitchFamily="-108" charset="-128"/>
+              </a:rPr>
+              <a:t>YW recon facts</a:t>
+            </a:r>
+            <a:endParaRPr lang="en-US" sz="3200" dirty="0">
+              <a:latin typeface="Arial" pitchFamily="-108" charset="0"/>
+              <a:ea typeface="ＭＳ Ｐゴシック" pitchFamily="-108" charset="-128"/>
+              <a:cs typeface="ＭＳ Ｐゴシック" pitchFamily="-108" charset="-128"/>
+            </a:endParaRPr>
+          </a:p>
+        </p:txBody>
+      </p:sp>
+      <p:sp>
+        <p:nvSpPr>
+          <p:cNvPr id="25" name="Rectangle 51"/>
+          <p:cNvSpPr>
+            <a:spLocks noChangeArrowheads="1"/>
+          </p:cNvSpPr>
           <p:nvPr/>
-        </p:nvPicPr>
-        <p:blipFill>
-          <a:blip r:embed="rId11"/>
-          <a:stretch>
-            <a:fillRect/>
-          </a:stretch>
-        </p:blipFill>
-        <p:spPr>
+        </p:nvSpPr>
+        <p:spPr bwMode="auto">
           <a:xfrm>
-            <a:off x="8048056" y="26803692"/>
-            <a:ext cx="2160240" cy="816748"/>
+            <a:off x="11587092" y="22723328"/>
+            <a:ext cx="20882320" cy="9052072"/>
           </a:xfrm>
           <a:prstGeom prst="rect">
             <a:avLst/>
           </a:prstGeom>
+          <a:solidFill>
+            <a:schemeClr val="bg1"/>
+          </a:solidFill>
+          <a:ln w="9525">
+            <a:noFill/>
+            <a:miter lim="800000"/>
+            <a:headEnd/>
+            <a:tailEnd/>
+          </a:ln>
         </p:spPr>
-      </p:pic>
+        <p:txBody>
+          <a:bodyPr lIns="360000" tIns="360000" rIns="360000" bIns="360000">
+            <a:prstTxWarp prst="textNoShape">
+              <a:avLst/>
+            </a:prstTxWarp>
+          </a:bodyPr>
+          <a:lstStyle/>
+          <a:p>
+            <a:pPr marL="381000" indent="-381000">
+              <a:spcBef>
+                <a:spcPct val="50000"/>
+              </a:spcBef>
+              <a:defRPr/>
+            </a:pPr>
+            <a:r>
+              <a:rPr lang="en-GB" sz="3600" b="1" dirty="0" smtClean="0">
+                <a:solidFill>
+                  <a:srgbClr val="CC3300"/>
+                </a:solidFill>
+              </a:rPr>
+              <a:t>Hybrid Queries for Fine-Grained Retrospective Provenance</a:t>
+            </a:r>
+          </a:p>
+          <a:p>
+            <a:pPr marL="468000" lvl="1" indent="-381000">
+              <a:buClr>
+                <a:schemeClr val="tx1"/>
+              </a:buClr>
+              <a:buSzPct val="100000"/>
+              <a:buFont typeface="Arial" charset="0"/>
+              <a:buChar char="•"/>
+              <a:defRPr/>
+            </a:pPr>
+            <a:r>
+              <a:rPr lang="en-US" sz="3200" b="1" dirty="0" smtClean="0">
+                <a:latin typeface="Arial" pitchFamily="-108" charset="0"/>
+                <a:ea typeface="ＭＳ Ｐゴシック" pitchFamily="-108" charset="-128"/>
+                <a:cs typeface="ＭＳ Ｐゴシック" pitchFamily="-108" charset="-128"/>
+              </a:rPr>
+              <a:t>YW recon </a:t>
+            </a:r>
+          </a:p>
+          <a:p>
+            <a:pPr marL="468000" lvl="1" indent="-381000">
+              <a:buClr>
+                <a:schemeClr val="tx1"/>
+              </a:buClr>
+              <a:buSzPct val="100000"/>
+              <a:buFont typeface="Arial" charset="0"/>
+              <a:buChar char="•"/>
+              <a:defRPr/>
+            </a:pPr>
+            <a:r>
+              <a:rPr lang="en-US" sz="3200" b="1" dirty="0" smtClean="0">
+                <a:latin typeface="Arial" pitchFamily="-108" charset="0"/>
+                <a:ea typeface="ＭＳ Ｐゴシック" pitchFamily="-108" charset="-128"/>
+                <a:cs typeface="ＭＳ Ｐゴシック" pitchFamily="-108" charset="-128"/>
+              </a:rPr>
+              <a:t>YW recon facts</a:t>
+            </a:r>
+            <a:endParaRPr lang="en-US" sz="3200" dirty="0">
+              <a:latin typeface="Arial" pitchFamily="-108" charset="0"/>
+              <a:ea typeface="ＭＳ Ｐゴシック" pitchFamily="-108" charset="-128"/>
+              <a:cs typeface="ＭＳ Ｐゴシック" pitchFamily="-108" charset="-128"/>
+            </a:endParaRPr>
+          </a:p>
+        </p:txBody>
+      </p:sp>
+      <p:sp>
+        <p:nvSpPr>
+          <p:cNvPr id="26" name="Rectangle 34"/>
+          <p:cNvSpPr>
+            <a:spLocks noChangeArrowheads="1"/>
+          </p:cNvSpPr>
+          <p:nvPr/>
+        </p:nvSpPr>
+        <p:spPr bwMode="auto">
+          <a:xfrm>
+            <a:off x="33034832" y="15768165"/>
+            <a:ext cx="9829800" cy="9610581"/>
+          </a:xfrm>
+          <a:prstGeom prst="rect">
+            <a:avLst/>
+          </a:prstGeom>
+          <a:solidFill>
+            <a:schemeClr val="bg1"/>
+          </a:solidFill>
+          <a:ln w="9525">
+            <a:noFill/>
+            <a:miter lim="800000"/>
+            <a:headEnd/>
+            <a:tailEnd/>
+          </a:ln>
+        </p:spPr>
+        <p:txBody>
+          <a:bodyPr lIns="360000" tIns="360000" rIns="360000" bIns="360000">
+            <a:prstTxWarp prst="textNoShape">
+              <a:avLst/>
+            </a:prstTxWarp>
+          </a:bodyPr>
+          <a:lstStyle/>
+          <a:p>
+            <a:pPr>
+              <a:spcBef>
+                <a:spcPct val="50000"/>
+              </a:spcBef>
+            </a:pPr>
+            <a:r>
+              <a:rPr lang="en-GB" sz="3600" b="1" dirty="0" smtClean="0">
+                <a:solidFill>
+                  <a:srgbClr val="CC3300"/>
+                </a:solidFill>
+              </a:rPr>
+              <a:t>References</a:t>
+            </a:r>
+          </a:p>
+          <a:p>
+            <a:pPr marL="468000" lvl="1" indent="-381000">
+              <a:buClr>
+                <a:schemeClr val="tx1"/>
+              </a:buClr>
+              <a:buSzPct val="100000"/>
+              <a:buFont typeface="Arial" charset="0"/>
+              <a:buChar char="•"/>
+              <a:defRPr/>
+            </a:pPr>
+            <a:r>
+              <a:rPr lang="en-GB" sz="2400" dirty="0" smtClean="0">
+                <a:latin typeface="Arial" pitchFamily="-108" charset="0"/>
+                <a:ea typeface="ＭＳ Ｐゴシック" pitchFamily="-108" charset="-128"/>
+                <a:cs typeface="ＭＳ Ｐゴシック" pitchFamily="-108" charset="-128"/>
+              </a:rPr>
+              <a:t>Y </a:t>
+            </a:r>
+            <a:r>
+              <a:rPr lang="en-GB" sz="2400" dirty="0">
+                <a:latin typeface="Arial" pitchFamily="-108" charset="0"/>
+                <a:ea typeface="ＭＳ Ｐゴシック" pitchFamily="-108" charset="-128"/>
+                <a:cs typeface="ＭＳ Ｐゴシック" pitchFamily="-108" charset="-128"/>
+              </a:rPr>
+              <a:t>Cao, D Vu, Q Wang, Q Zhang, P Ramesh, T McPhillips, P </a:t>
+            </a:r>
+            <a:r>
+              <a:rPr lang="en-GB" sz="2400" dirty="0" err="1">
+                <a:latin typeface="Arial" pitchFamily="-108" charset="0"/>
+                <a:ea typeface="ＭＳ Ｐゴシック" pitchFamily="-108" charset="-128"/>
+                <a:cs typeface="ＭＳ Ｐゴシック" pitchFamily="-108" charset="-128"/>
+              </a:rPr>
+              <a:t>Missier</a:t>
+            </a:r>
+            <a:r>
+              <a:rPr lang="en-GB" sz="2400" dirty="0">
+                <a:latin typeface="Arial" pitchFamily="-108" charset="0"/>
+                <a:ea typeface="ＭＳ Ｐゴシック" pitchFamily="-108" charset="-128"/>
+                <a:cs typeface="ＭＳ Ｐゴシック" pitchFamily="-108" charset="-128"/>
+              </a:rPr>
+              <a:t>, B </a:t>
+            </a:r>
+            <a:r>
+              <a:rPr lang="en-GB" sz="2400" dirty="0" err="1">
+                <a:latin typeface="Arial" pitchFamily="-108" charset="0"/>
+                <a:ea typeface="ＭＳ Ｐゴシック" pitchFamily="-108" charset="-128"/>
+                <a:cs typeface="ＭＳ Ｐゴシック" pitchFamily="-108" charset="-128"/>
+              </a:rPr>
+              <a:t>Ludäscher</a:t>
+            </a:r>
+            <a:r>
+              <a:rPr lang="en-GB" sz="2400" dirty="0">
+                <a:latin typeface="Arial" pitchFamily="-108" charset="0"/>
+                <a:ea typeface="ＭＳ Ｐゴシック" pitchFamily="-108" charset="-128"/>
+                <a:cs typeface="ＭＳ Ｐゴシック" pitchFamily="-108" charset="-128"/>
+              </a:rPr>
+              <a:t> (2016). </a:t>
+            </a:r>
+            <a:r>
+              <a:rPr lang="en-GB" sz="2400" dirty="0" err="1">
+                <a:latin typeface="Arial" pitchFamily="-108" charset="0"/>
+                <a:ea typeface="ＭＳ Ｐゴシック" pitchFamily="-108" charset="-128"/>
+                <a:cs typeface="ＭＳ Ｐゴシック" pitchFamily="-108" charset="-128"/>
+              </a:rPr>
+              <a:t>DataONE</a:t>
+            </a:r>
+            <a:r>
+              <a:rPr lang="en-GB" sz="2400" dirty="0">
+                <a:latin typeface="Arial" pitchFamily="-108" charset="0"/>
+                <a:ea typeface="ＭＳ Ｐゴシック" pitchFamily="-108" charset="-128"/>
+                <a:cs typeface="ＭＳ Ｐゴシック" pitchFamily="-108" charset="-128"/>
+              </a:rPr>
+              <a:t> AHM Provenance Demonstration: </a:t>
+            </a:r>
+            <a:r>
+              <a:rPr lang="en-GB" sz="2400" dirty="0">
+                <a:latin typeface="Arial" pitchFamily="-108" charset="0"/>
+                <a:ea typeface="ＭＳ Ｐゴシック" pitchFamily="-108" charset="-128"/>
+                <a:cs typeface="ＭＳ Ｐゴシック" pitchFamily="-108" charset="-128"/>
+                <a:hlinkClick r:id="rId10"/>
+              </a:rPr>
+              <a:t>https://github.com/idaks/dataone-ahm-2016-poster</a:t>
+            </a:r>
+            <a:r>
+              <a:rPr lang="en-GB" sz="2400" dirty="0">
+                <a:latin typeface="Arial" pitchFamily="-108" charset="0"/>
+                <a:ea typeface="ＭＳ Ｐゴシック" pitchFamily="-108" charset="-128"/>
+                <a:cs typeface="ＭＳ Ｐゴシック" pitchFamily="-108" charset="-128"/>
+              </a:rPr>
+              <a:t> </a:t>
+            </a:r>
+          </a:p>
+          <a:p>
+            <a:pPr marL="468000" lvl="1" indent="-381000">
+              <a:buClr>
+                <a:schemeClr val="tx1"/>
+              </a:buClr>
+              <a:buSzPct val="100000"/>
+              <a:buFont typeface="Arial" charset="0"/>
+              <a:buChar char="•"/>
+              <a:defRPr/>
+            </a:pPr>
+            <a:r>
+              <a:rPr lang="en-GB" sz="2400" dirty="0" err="1" smtClean="0">
+                <a:latin typeface="Arial" pitchFamily="-108" charset="0"/>
+                <a:ea typeface="ＭＳ Ｐゴシック" pitchFamily="-108" charset="-128"/>
+                <a:cs typeface="ＭＳ Ｐゴシック" pitchFamily="-108" charset="-128"/>
+              </a:rPr>
+              <a:t>YesWorkflow</a:t>
+            </a:r>
+            <a:r>
+              <a:rPr lang="en-GB" sz="2400" dirty="0" smtClean="0">
+                <a:latin typeface="Arial" pitchFamily="-108" charset="0"/>
+                <a:ea typeface="ＭＳ Ｐゴシック" pitchFamily="-108" charset="-128"/>
+                <a:cs typeface="ＭＳ Ｐゴシック" pitchFamily="-108" charset="-128"/>
+              </a:rPr>
+              <a:t> </a:t>
+            </a:r>
+            <a:r>
+              <a:rPr lang="en-GB" sz="2400" dirty="0">
+                <a:latin typeface="Arial" pitchFamily="-108" charset="0"/>
+                <a:ea typeface="ＭＳ Ｐゴシック" pitchFamily="-108" charset="-128"/>
+                <a:cs typeface="ＭＳ Ｐゴシック" pitchFamily="-108" charset="-128"/>
+              </a:rPr>
+              <a:t>Project and Tools, </a:t>
+            </a:r>
+            <a:r>
+              <a:rPr lang="en-GB" sz="2400" dirty="0">
+                <a:latin typeface="Arial" pitchFamily="-108" charset="0"/>
+                <a:ea typeface="ＭＳ Ｐゴシック" pitchFamily="-108" charset="-128"/>
+                <a:cs typeface="ＭＳ Ｐゴシック" pitchFamily="-108" charset="-128"/>
+                <a:hlinkClick r:id="rId11"/>
+              </a:rPr>
+              <a:t>https://</a:t>
+            </a:r>
+            <a:r>
+              <a:rPr lang="en-GB" sz="2400" dirty="0">
+                <a:latin typeface="Arial" pitchFamily="-108" charset="0"/>
+                <a:ea typeface="ＭＳ Ｐゴシック" pitchFamily="-108" charset="-128"/>
+                <a:cs typeface="ＭＳ Ｐゴシック" pitchFamily="-108" charset="-128"/>
+                <a:hlinkClick r:id="rId11"/>
+              </a:rPr>
+              <a:t>github.com/yesworkflow-org</a:t>
+            </a:r>
+            <a:r>
+              <a:rPr lang="en-GB" sz="2400" dirty="0">
+                <a:latin typeface="Arial" pitchFamily="-108" charset="0"/>
+                <a:ea typeface="ＭＳ Ｐゴシック" pitchFamily="-108" charset="-128"/>
+                <a:cs typeface="ＭＳ Ｐゴシック" pitchFamily="-108" charset="-128"/>
+              </a:rPr>
+              <a:t> </a:t>
+            </a:r>
+          </a:p>
+          <a:p>
+            <a:pPr marL="468000" lvl="1" indent="-381000">
+              <a:buClr>
+                <a:schemeClr val="tx1"/>
+              </a:buClr>
+              <a:buSzPct val="100000"/>
+              <a:buFont typeface="Arial" charset="0"/>
+              <a:buChar char="•"/>
+              <a:defRPr/>
+            </a:pPr>
+            <a:r>
+              <a:rPr lang="en-GB" sz="2400" dirty="0" smtClean="0">
+                <a:latin typeface="Arial" pitchFamily="-108" charset="0"/>
+                <a:ea typeface="ＭＳ Ｐゴシック" pitchFamily="-108" charset="-128"/>
+                <a:cs typeface="ＭＳ Ｐゴシック" pitchFamily="-108" charset="-128"/>
+              </a:rPr>
+              <a:t>T</a:t>
+            </a:r>
+            <a:r>
+              <a:rPr lang="en-GB" sz="2400" dirty="0">
+                <a:latin typeface="Arial" pitchFamily="-108" charset="0"/>
+                <a:ea typeface="ＭＳ Ｐゴシック" pitchFamily="-108" charset="-128"/>
+                <a:cs typeface="ＭＳ Ｐゴシック" pitchFamily="-108" charset="-128"/>
+              </a:rPr>
+              <a:t>. </a:t>
+            </a:r>
+            <a:r>
+              <a:rPr lang="en-GB" sz="2400" dirty="0">
+                <a:latin typeface="Arial" pitchFamily="-108" charset="0"/>
+                <a:ea typeface="ＭＳ Ｐゴシック" pitchFamily="-108" charset="-128"/>
+                <a:cs typeface="ＭＳ Ｐゴシック" pitchFamily="-108" charset="-128"/>
+              </a:rPr>
+              <a:t>McPhillips, T. </a:t>
+            </a:r>
+            <a:r>
+              <a:rPr lang="en-GB" sz="2400" dirty="0">
+                <a:latin typeface="Arial" pitchFamily="-108" charset="0"/>
+                <a:ea typeface="ＭＳ Ｐゴシック" pitchFamily="-108" charset="-128"/>
+                <a:cs typeface="ＭＳ Ｐゴシック" pitchFamily="-108" charset="-128"/>
+              </a:rPr>
+              <a:t>Song, </a:t>
+            </a:r>
+            <a:r>
+              <a:rPr lang="en-GB" sz="2400" dirty="0" smtClean="0">
+                <a:latin typeface="Arial" pitchFamily="-108" charset="0"/>
+                <a:ea typeface="ＭＳ Ｐゴシック" pitchFamily="-108" charset="-128"/>
+                <a:cs typeface="ＭＳ Ｐゴシック" pitchFamily="-108" charset="-128"/>
+              </a:rPr>
+              <a:t>et al.(2015</a:t>
+            </a:r>
+            <a:r>
+              <a:rPr lang="en-GB" sz="2400" dirty="0">
+                <a:latin typeface="Arial" pitchFamily="-108" charset="0"/>
+                <a:ea typeface="ＭＳ Ｐゴシック" pitchFamily="-108" charset="-128"/>
+                <a:cs typeface="ＭＳ Ｐゴシック" pitchFamily="-108" charset="-128"/>
+              </a:rPr>
+              <a:t>). </a:t>
+            </a:r>
+            <a:r>
+              <a:rPr lang="en-GB" sz="2400" dirty="0" err="1">
+                <a:latin typeface="Arial" pitchFamily="-108" charset="0"/>
+                <a:ea typeface="ＭＳ Ｐゴシック" pitchFamily="-108" charset="-128"/>
+                <a:cs typeface="ＭＳ Ｐゴシック" pitchFamily="-108" charset="-128"/>
+              </a:rPr>
+              <a:t>YesWorkflow</a:t>
+            </a:r>
+            <a:r>
+              <a:rPr lang="en-GB" sz="2400" dirty="0">
+                <a:latin typeface="Arial" pitchFamily="-108" charset="0"/>
+                <a:ea typeface="ＭＳ Ｐゴシック" pitchFamily="-108" charset="-128"/>
+                <a:cs typeface="ＭＳ Ｐゴシック" pitchFamily="-108" charset="-128"/>
+              </a:rPr>
+              <a:t>: A User-Oriented, Language-Independent Tool for Recovering Workflow Information from Scripts. Intl. Journal of Digital Curation 10, 298-313. </a:t>
+            </a:r>
+          </a:p>
+          <a:p>
+            <a:pPr marL="468000" lvl="1" indent="-381000">
+              <a:buClr>
+                <a:schemeClr val="tx1"/>
+              </a:buClr>
+              <a:buSzPct val="100000"/>
+              <a:buFont typeface="Arial" charset="0"/>
+              <a:buChar char="•"/>
+              <a:defRPr/>
+            </a:pPr>
+            <a:r>
+              <a:rPr lang="en-GB" sz="2400" dirty="0" smtClean="0">
+                <a:latin typeface="Arial" pitchFamily="-108" charset="0"/>
+                <a:ea typeface="ＭＳ Ｐゴシック" pitchFamily="-108" charset="-128"/>
+                <a:cs typeface="ＭＳ Ｐゴシック" pitchFamily="-108" charset="-128"/>
+              </a:rPr>
+              <a:t>T</a:t>
+            </a:r>
+            <a:r>
+              <a:rPr lang="en-GB" sz="2400" dirty="0">
+                <a:latin typeface="Arial" pitchFamily="-108" charset="0"/>
+                <a:ea typeface="ＭＳ Ｐゴシック" pitchFamily="-108" charset="-128"/>
+                <a:cs typeface="ＭＳ Ｐゴシック" pitchFamily="-108" charset="-128"/>
+              </a:rPr>
+              <a:t>. </a:t>
+            </a:r>
+            <a:r>
+              <a:rPr lang="en-GB" sz="2400" dirty="0">
+                <a:latin typeface="Arial" pitchFamily="-108" charset="0"/>
+                <a:ea typeface="ＭＳ Ｐゴシック" pitchFamily="-108" charset="-128"/>
+                <a:cs typeface="ＭＳ Ｐゴシック" pitchFamily="-108" charset="-128"/>
+              </a:rPr>
+              <a:t>McPhillips, S. Bowers, K. </a:t>
+            </a:r>
+            <a:r>
+              <a:rPr lang="en-GB" sz="2400" dirty="0" err="1">
+                <a:latin typeface="Arial" pitchFamily="-108" charset="0"/>
+                <a:ea typeface="ＭＳ Ｐゴシック" pitchFamily="-108" charset="-128"/>
+                <a:cs typeface="ＭＳ Ｐゴシック" pitchFamily="-108" charset="-128"/>
+              </a:rPr>
+              <a:t>Belhajjame</a:t>
+            </a:r>
+            <a:r>
+              <a:rPr lang="en-GB" sz="2400" dirty="0">
+                <a:latin typeface="Arial" pitchFamily="-108" charset="0"/>
+                <a:ea typeface="ＭＳ Ｐゴシック" pitchFamily="-108" charset="-128"/>
+                <a:cs typeface="ＭＳ Ｐゴシック" pitchFamily="-108" charset="-128"/>
+              </a:rPr>
+              <a:t>, B. </a:t>
+            </a:r>
+            <a:r>
+              <a:rPr lang="en-GB" sz="2400" dirty="0" err="1">
+                <a:latin typeface="Arial" pitchFamily="-108" charset="0"/>
+                <a:ea typeface="ＭＳ Ｐゴシック" pitchFamily="-108" charset="-128"/>
+                <a:cs typeface="ＭＳ Ｐゴシック" pitchFamily="-108" charset="-128"/>
+              </a:rPr>
+              <a:t>Ludäscher</a:t>
+            </a:r>
+            <a:r>
+              <a:rPr lang="en-GB" sz="2400" dirty="0">
+                <a:latin typeface="Arial" pitchFamily="-108" charset="0"/>
+                <a:ea typeface="ＭＳ Ｐゴシック" pitchFamily="-108" charset="-128"/>
+                <a:cs typeface="ＭＳ Ｐゴシック" pitchFamily="-108" charset="-128"/>
+              </a:rPr>
+              <a:t> (2015). Retrospective Provenance Without a Runtime Provenance Recorder. Workshop on the Theory and Practice of Provenance (</a:t>
+            </a:r>
+            <a:r>
+              <a:rPr lang="en-GB" sz="2400" dirty="0" err="1">
+                <a:latin typeface="Arial" pitchFamily="-108" charset="0"/>
+                <a:ea typeface="ＭＳ Ｐゴシック" pitchFamily="-108" charset="-128"/>
+                <a:cs typeface="ＭＳ Ｐゴシック" pitchFamily="-108" charset="-128"/>
+              </a:rPr>
+              <a:t>TaPP</a:t>
+            </a:r>
+            <a:r>
+              <a:rPr lang="en-GB" sz="2400" dirty="0">
+                <a:latin typeface="Arial" pitchFamily="-108" charset="0"/>
+                <a:ea typeface="ＭＳ Ｐゴシック" pitchFamily="-108" charset="-128"/>
+                <a:cs typeface="ＭＳ Ｐゴシック" pitchFamily="-108" charset="-128"/>
+              </a:rPr>
+              <a:t>).</a:t>
+            </a:r>
+          </a:p>
+          <a:p>
+            <a:pPr marL="468000" lvl="1" indent="-381000">
+              <a:buClr>
+                <a:schemeClr val="tx1"/>
+              </a:buClr>
+              <a:buSzPct val="100000"/>
+              <a:buFont typeface="Arial" charset="0"/>
+              <a:buChar char="•"/>
+              <a:defRPr/>
+            </a:pPr>
+            <a:r>
+              <a:rPr lang="en-GB" sz="2400" dirty="0" smtClean="0">
+                <a:latin typeface="Arial" pitchFamily="-108" charset="0"/>
+                <a:ea typeface="ＭＳ Ｐゴシック" pitchFamily="-108" charset="-128"/>
+                <a:cs typeface="ＭＳ Ｐゴシック" pitchFamily="-108" charset="-128"/>
+              </a:rPr>
+              <a:t>Cao</a:t>
+            </a:r>
+            <a:r>
+              <a:rPr lang="en-GB" sz="2400" dirty="0">
+                <a:latin typeface="Arial" pitchFamily="-108" charset="0"/>
+                <a:ea typeface="ＭＳ Ｐゴシック" pitchFamily="-108" charset="-128"/>
+                <a:cs typeface="ＭＳ Ｐゴシック" pitchFamily="-108" charset="-128"/>
+              </a:rPr>
+              <a:t>, Y., Jones, C., Cuevas-</a:t>
+            </a:r>
+            <a:r>
+              <a:rPr lang="en-GB" sz="2400" dirty="0" err="1">
+                <a:latin typeface="Arial" pitchFamily="-108" charset="0"/>
+                <a:ea typeface="ＭＳ Ｐゴシック" pitchFamily="-108" charset="-128"/>
+                <a:cs typeface="ＭＳ Ｐゴシック" pitchFamily="-108" charset="-128"/>
+              </a:rPr>
+              <a:t>Vicenttín</a:t>
+            </a:r>
+            <a:r>
+              <a:rPr lang="en-GB" sz="2400" dirty="0">
+                <a:latin typeface="Arial" pitchFamily="-108" charset="0"/>
+                <a:ea typeface="ＭＳ Ｐゴシック" pitchFamily="-108" charset="-128"/>
+                <a:cs typeface="ＭＳ Ｐゴシック" pitchFamily="-108" charset="-128"/>
+              </a:rPr>
+              <a:t>, V., Jones, M.B., </a:t>
+            </a:r>
+            <a:r>
+              <a:rPr lang="en-GB" sz="2400" dirty="0" err="1">
+                <a:latin typeface="Arial" pitchFamily="-108" charset="0"/>
+                <a:ea typeface="ＭＳ Ｐゴシック" pitchFamily="-108" charset="-128"/>
+                <a:cs typeface="ＭＳ Ｐゴシック" pitchFamily="-108" charset="-128"/>
+              </a:rPr>
+              <a:t>Ludäscher</a:t>
+            </a:r>
+            <a:r>
+              <a:rPr lang="en-GB" sz="2400" dirty="0">
+                <a:latin typeface="Arial" pitchFamily="-108" charset="0"/>
+                <a:ea typeface="ＭＳ Ｐゴシック" pitchFamily="-108" charset="-128"/>
+                <a:cs typeface="ＭＳ Ｐゴシック" pitchFamily="-108" charset="-128"/>
+              </a:rPr>
+              <a:t>, B., McPhillips, T., </a:t>
+            </a:r>
+            <a:r>
+              <a:rPr lang="en-GB" sz="2400" dirty="0" err="1">
+                <a:latin typeface="Arial" pitchFamily="-108" charset="0"/>
+                <a:ea typeface="ＭＳ Ｐゴシック" pitchFamily="-108" charset="-128"/>
+                <a:cs typeface="ＭＳ Ｐゴシック" pitchFamily="-108" charset="-128"/>
+              </a:rPr>
+              <a:t>Missier</a:t>
+            </a:r>
+            <a:r>
+              <a:rPr lang="en-GB" sz="2400" dirty="0" smtClean="0">
+                <a:latin typeface="Arial" pitchFamily="-108" charset="0"/>
+                <a:ea typeface="ＭＳ Ｐゴシック" pitchFamily="-108" charset="-128"/>
+                <a:cs typeface="ＭＳ Ｐゴシック" pitchFamily="-108" charset="-128"/>
+              </a:rPr>
+              <a:t>, et al., </a:t>
+            </a:r>
+            <a:r>
+              <a:rPr lang="en-GB" sz="2400" dirty="0">
+                <a:latin typeface="Arial" pitchFamily="-108" charset="0"/>
+                <a:ea typeface="ＭＳ Ｐゴシック" pitchFamily="-108" charset="-128"/>
+                <a:cs typeface="ＭＳ Ｐゴシック" pitchFamily="-108" charset="-128"/>
+              </a:rPr>
+              <a:t>2016, June. </a:t>
+            </a:r>
+            <a:r>
+              <a:rPr lang="en-GB" sz="2400" dirty="0" err="1">
+                <a:latin typeface="Arial" pitchFamily="-108" charset="0"/>
+                <a:ea typeface="ＭＳ Ｐゴシック" pitchFamily="-108" charset="-128"/>
+                <a:cs typeface="ＭＳ Ｐゴシック" pitchFamily="-108" charset="-128"/>
+              </a:rPr>
+              <a:t>DataONE</a:t>
+            </a:r>
+            <a:r>
+              <a:rPr lang="en-GB" sz="2400" dirty="0">
+                <a:latin typeface="Arial" pitchFamily="-108" charset="0"/>
+                <a:ea typeface="ＭＳ Ｐゴシック" pitchFamily="-108" charset="-128"/>
+                <a:cs typeface="ＭＳ Ｐゴシック" pitchFamily="-108" charset="-128"/>
+              </a:rPr>
+              <a:t>: A Data Federation with Provenance Support. Intl. Provenance and Annotation Workshop (IPAW). Springer.</a:t>
+            </a:r>
+          </a:p>
+          <a:p>
+            <a:pPr marL="468000" lvl="1" indent="-381000">
+              <a:buClr>
+                <a:schemeClr val="tx1"/>
+              </a:buClr>
+              <a:buSzPct val="100000"/>
+              <a:buFont typeface="Arial" charset="0"/>
+              <a:buChar char="•"/>
+              <a:defRPr/>
+            </a:pPr>
+            <a:r>
+              <a:rPr lang="en-GB" sz="2400" dirty="0" smtClean="0">
+                <a:latin typeface="Arial" pitchFamily="-108" charset="0"/>
+                <a:ea typeface="ＭＳ Ｐゴシック" pitchFamily="-108" charset="-128"/>
+                <a:cs typeface="ＭＳ Ｐゴシック" pitchFamily="-108" charset="-128"/>
+              </a:rPr>
+              <a:t>Pimentel</a:t>
+            </a:r>
+            <a:r>
+              <a:rPr lang="en-GB" sz="2400" dirty="0">
+                <a:latin typeface="Arial" pitchFamily="-108" charset="0"/>
+                <a:ea typeface="ＭＳ Ｐゴシック" pitchFamily="-108" charset="-128"/>
+                <a:cs typeface="ＭＳ Ｐゴシック" pitchFamily="-108" charset="-128"/>
+              </a:rPr>
+              <a:t>, J.F., </a:t>
+            </a:r>
+            <a:r>
+              <a:rPr lang="en-GB" sz="2400" dirty="0" err="1">
+                <a:latin typeface="Arial" pitchFamily="-108" charset="0"/>
+                <a:ea typeface="ＭＳ Ｐゴシック" pitchFamily="-108" charset="-128"/>
+                <a:cs typeface="ＭＳ Ｐゴシック" pitchFamily="-108" charset="-128"/>
+              </a:rPr>
+              <a:t>Dey</a:t>
+            </a:r>
+            <a:r>
+              <a:rPr lang="en-GB" sz="2400" dirty="0">
+                <a:latin typeface="Arial" pitchFamily="-108" charset="0"/>
+                <a:ea typeface="ＭＳ Ｐゴシック" pitchFamily="-108" charset="-128"/>
+                <a:cs typeface="ＭＳ Ｐゴシック" pitchFamily="-108" charset="-128"/>
+              </a:rPr>
+              <a:t>, S., McPhillips, T., </a:t>
+            </a:r>
+            <a:r>
+              <a:rPr lang="en-GB" sz="2400" dirty="0" err="1">
+                <a:latin typeface="Arial" pitchFamily="-108" charset="0"/>
+                <a:ea typeface="ＭＳ Ｐゴシック" pitchFamily="-108" charset="-128"/>
+                <a:cs typeface="ＭＳ Ｐゴシック" pitchFamily="-108" charset="-128"/>
+              </a:rPr>
+              <a:t>Belhajjame</a:t>
+            </a:r>
+            <a:r>
+              <a:rPr lang="en-GB" sz="2400" dirty="0">
+                <a:latin typeface="Arial" pitchFamily="-108" charset="0"/>
+                <a:ea typeface="ＭＳ Ｐゴシック" pitchFamily="-108" charset="-128"/>
+                <a:cs typeface="ＭＳ Ｐゴシック" pitchFamily="-108" charset="-128"/>
+              </a:rPr>
+              <a:t>, K., Koop, D., </a:t>
+            </a:r>
+            <a:r>
+              <a:rPr lang="en-GB" sz="2400" dirty="0" err="1">
+                <a:latin typeface="Arial" pitchFamily="-108" charset="0"/>
+                <a:ea typeface="ＭＳ Ｐゴシック" pitchFamily="-108" charset="-128"/>
+                <a:cs typeface="ＭＳ Ｐゴシック" pitchFamily="-108" charset="-128"/>
+              </a:rPr>
+              <a:t>Murta</a:t>
+            </a:r>
+            <a:r>
+              <a:rPr lang="en-GB" sz="2400" dirty="0">
+                <a:latin typeface="Arial" pitchFamily="-108" charset="0"/>
+                <a:ea typeface="ＭＳ Ｐゴシック" pitchFamily="-108" charset="-128"/>
+                <a:cs typeface="ＭＳ Ｐゴシック" pitchFamily="-108" charset="-128"/>
+              </a:rPr>
+              <a:t>, L., </a:t>
+            </a:r>
+            <a:r>
+              <a:rPr lang="en-GB" sz="2400" dirty="0" err="1">
+                <a:latin typeface="Arial" pitchFamily="-108" charset="0"/>
+                <a:ea typeface="ＭＳ Ｐゴシック" pitchFamily="-108" charset="-128"/>
+                <a:cs typeface="ＭＳ Ｐゴシック" pitchFamily="-108" charset="-128"/>
+              </a:rPr>
+              <a:t>Braganholo</a:t>
+            </a:r>
+            <a:r>
+              <a:rPr lang="en-GB" sz="2400" dirty="0">
+                <a:latin typeface="Arial" pitchFamily="-108" charset="0"/>
+                <a:ea typeface="ＭＳ Ｐゴシック" pitchFamily="-108" charset="-128"/>
+                <a:cs typeface="ＭＳ Ｐゴシック" pitchFamily="-108" charset="-128"/>
+              </a:rPr>
+              <a:t>, V. and </a:t>
+            </a:r>
+            <a:r>
+              <a:rPr lang="en-GB" sz="2400" dirty="0" err="1">
+                <a:latin typeface="Arial" pitchFamily="-108" charset="0"/>
+                <a:ea typeface="ＭＳ Ｐゴシック" pitchFamily="-108" charset="-128"/>
+                <a:cs typeface="ＭＳ Ｐゴシック" pitchFamily="-108" charset="-128"/>
+              </a:rPr>
+              <a:t>Ludäscher</a:t>
+            </a:r>
+            <a:r>
+              <a:rPr lang="en-GB" sz="2400" dirty="0">
+                <a:latin typeface="Arial" pitchFamily="-108" charset="0"/>
+                <a:ea typeface="ＭＳ Ｐゴシック" pitchFamily="-108" charset="-128"/>
+                <a:cs typeface="ＭＳ Ｐゴシック" pitchFamily="-108" charset="-128"/>
+              </a:rPr>
+              <a:t>, B., 2016, June. Yin &amp; Yang: demonstrating complementary provenance from </a:t>
+            </a:r>
+            <a:r>
+              <a:rPr lang="en-GB" sz="2400" dirty="0" err="1">
+                <a:latin typeface="Arial" pitchFamily="-108" charset="0"/>
+                <a:ea typeface="ＭＳ Ｐゴシック" pitchFamily="-108" charset="-128"/>
+                <a:cs typeface="ＭＳ Ｐゴシック" pitchFamily="-108" charset="-128"/>
+              </a:rPr>
+              <a:t>noWorkflow</a:t>
+            </a:r>
+            <a:r>
+              <a:rPr lang="en-GB" sz="2400" dirty="0">
+                <a:latin typeface="Arial" pitchFamily="-108" charset="0"/>
+                <a:ea typeface="ＭＳ Ｐゴシック" pitchFamily="-108" charset="-128"/>
+                <a:cs typeface="ＭＳ Ｐゴシック" pitchFamily="-108" charset="-128"/>
+              </a:rPr>
+              <a:t> &amp; </a:t>
+            </a:r>
+            <a:r>
+              <a:rPr lang="en-GB" sz="2400" dirty="0" err="1">
+                <a:latin typeface="Arial" pitchFamily="-108" charset="0"/>
+                <a:ea typeface="ＭＳ Ｐゴシック" pitchFamily="-108" charset="-128"/>
+                <a:cs typeface="ＭＳ Ｐゴシック" pitchFamily="-108" charset="-128"/>
+              </a:rPr>
+              <a:t>YesWorkflow</a:t>
+            </a:r>
+            <a:r>
+              <a:rPr lang="en-GB" sz="2400" dirty="0">
+                <a:latin typeface="Arial" pitchFamily="-108" charset="0"/>
+                <a:ea typeface="ＭＳ Ｐゴシック" pitchFamily="-108" charset="-128"/>
+                <a:cs typeface="ＭＳ Ｐゴシック" pitchFamily="-108" charset="-128"/>
+              </a:rPr>
+              <a:t>. Intl. Provenance and Annotation Workshop (IPAW). Springer.</a:t>
+            </a:r>
+            <a:endParaRPr lang="en-GB" sz="2400" dirty="0">
+              <a:latin typeface="Arial" pitchFamily="-108" charset="0"/>
+              <a:ea typeface="ＭＳ Ｐゴシック" pitchFamily="-108" charset="-128"/>
+              <a:cs typeface="ＭＳ Ｐゴシック" pitchFamily="-108" charset="-128"/>
+            </a:endParaRPr>
+          </a:p>
+          <a:p>
+            <a:pPr marL="468000" lvl="1" indent="-381000">
+              <a:buClr>
+                <a:schemeClr val="tx1"/>
+              </a:buClr>
+              <a:buSzPct val="100000"/>
+              <a:buFont typeface="Arial" charset="0"/>
+              <a:buChar char="•"/>
+              <a:defRPr/>
+            </a:pPr>
+            <a:endParaRPr lang="en-US" sz="2400" dirty="0">
+              <a:latin typeface="Arial" pitchFamily="-108" charset="0"/>
+              <a:ea typeface="ＭＳ Ｐゴシック" pitchFamily="-108" charset="-128"/>
+              <a:cs typeface="ＭＳ Ｐゴシック" pitchFamily="-108" charset="-128"/>
+            </a:endParaRPr>
+          </a:p>
+        </p:txBody>
+      </p:sp>
     </p:spTree>
   </p:cSld>
   <p:clrMapOvr>

</xml_diff>